<commit_message>
lab 3 complete, docs generated for repo
</commit_message>
<xml_diff>
--- a/docs/source_files/gfx.pptx
+++ b/docs/source_files/gfx.pptx
@@ -8,7 +8,8 @@
     <p:sldId id="256" r:id="rId2"/>
     <p:sldId id="258" r:id="rId3"/>
     <p:sldId id="259" r:id="rId4"/>
-    <p:sldId id="257" r:id="rId5"/>
+    <p:sldId id="260" r:id="rId5"/>
+    <p:sldId id="257" r:id="rId6"/>
   </p:sldIdLst>
   <p:sldSz cx="12192000" cy="6858000"/>
   <p:notesSz cx="6858000" cy="9144000"/>
@@ -273,7 +274,7 @@
           <a:p>
             <a:fld id="{862A43D6-B66C-1E4C-B8EA-E7502AB369A6}" type="datetimeFigureOut">
               <a:rPr lang="en-US" smtClean="0"/>
-              <a:t>11/12/19</a:t>
+              <a:t>11/15/19</a:t>
             </a:fld>
             <a:endParaRPr lang="en-US"/>
           </a:p>
@@ -471,7 +472,7 @@
           <a:p>
             <a:fld id="{862A43D6-B66C-1E4C-B8EA-E7502AB369A6}" type="datetimeFigureOut">
               <a:rPr lang="en-US" smtClean="0"/>
-              <a:t>11/12/19</a:t>
+              <a:t>11/15/19</a:t>
             </a:fld>
             <a:endParaRPr lang="en-US"/>
           </a:p>
@@ -679,7 +680,7 @@
           <a:p>
             <a:fld id="{862A43D6-B66C-1E4C-B8EA-E7502AB369A6}" type="datetimeFigureOut">
               <a:rPr lang="en-US" smtClean="0"/>
-              <a:t>11/12/19</a:t>
+              <a:t>11/15/19</a:t>
             </a:fld>
             <a:endParaRPr lang="en-US"/>
           </a:p>
@@ -877,7 +878,7 @@
           <a:p>
             <a:fld id="{862A43D6-B66C-1E4C-B8EA-E7502AB369A6}" type="datetimeFigureOut">
               <a:rPr lang="en-US" smtClean="0"/>
-              <a:t>11/12/19</a:t>
+              <a:t>11/15/19</a:t>
             </a:fld>
             <a:endParaRPr lang="en-US"/>
           </a:p>
@@ -1152,7 +1153,7 @@
           <a:p>
             <a:fld id="{862A43D6-B66C-1E4C-B8EA-E7502AB369A6}" type="datetimeFigureOut">
               <a:rPr lang="en-US" smtClean="0"/>
-              <a:t>11/12/19</a:t>
+              <a:t>11/15/19</a:t>
             </a:fld>
             <a:endParaRPr lang="en-US"/>
           </a:p>
@@ -1417,7 +1418,7 @@
           <a:p>
             <a:fld id="{862A43D6-B66C-1E4C-B8EA-E7502AB369A6}" type="datetimeFigureOut">
               <a:rPr lang="en-US" smtClean="0"/>
-              <a:t>11/12/19</a:t>
+              <a:t>11/15/19</a:t>
             </a:fld>
             <a:endParaRPr lang="en-US"/>
           </a:p>
@@ -1829,7 +1830,7 @@
           <a:p>
             <a:fld id="{862A43D6-B66C-1E4C-B8EA-E7502AB369A6}" type="datetimeFigureOut">
               <a:rPr lang="en-US" smtClean="0"/>
-              <a:t>11/12/19</a:t>
+              <a:t>11/15/19</a:t>
             </a:fld>
             <a:endParaRPr lang="en-US"/>
           </a:p>
@@ -1970,7 +1971,7 @@
           <a:p>
             <a:fld id="{862A43D6-B66C-1E4C-B8EA-E7502AB369A6}" type="datetimeFigureOut">
               <a:rPr lang="en-US" smtClean="0"/>
-              <a:t>11/12/19</a:t>
+              <a:t>11/15/19</a:t>
             </a:fld>
             <a:endParaRPr lang="en-US"/>
           </a:p>
@@ -2083,7 +2084,7 @@
           <a:p>
             <a:fld id="{862A43D6-B66C-1E4C-B8EA-E7502AB369A6}" type="datetimeFigureOut">
               <a:rPr lang="en-US" smtClean="0"/>
-              <a:t>11/12/19</a:t>
+              <a:t>11/15/19</a:t>
             </a:fld>
             <a:endParaRPr lang="en-US"/>
           </a:p>
@@ -2394,7 +2395,7 @@
           <a:p>
             <a:fld id="{862A43D6-B66C-1E4C-B8EA-E7502AB369A6}" type="datetimeFigureOut">
               <a:rPr lang="en-US" smtClean="0"/>
-              <a:t>11/12/19</a:t>
+              <a:t>11/15/19</a:t>
             </a:fld>
             <a:endParaRPr lang="en-US"/>
           </a:p>
@@ -2682,7 +2683,7 @@
           <a:p>
             <a:fld id="{862A43D6-B66C-1E4C-B8EA-E7502AB369A6}" type="datetimeFigureOut">
               <a:rPr lang="en-US" smtClean="0"/>
-              <a:t>11/12/19</a:t>
+              <a:t>11/15/19</a:t>
             </a:fld>
             <a:endParaRPr lang="en-US"/>
           </a:p>
@@ -2923,7 +2924,7 @@
           <a:p>
             <a:fld id="{862A43D6-B66C-1E4C-B8EA-E7502AB369A6}" type="datetimeFigureOut">
               <a:rPr lang="en-US" smtClean="0"/>
-              <a:t>11/12/19</a:t>
+              <a:t>11/15/19</a:t>
             </a:fld>
             <a:endParaRPr lang="en-US"/>
           </a:p>
@@ -8635,6 +8636,2928 @@
           <a:chExt cx="0" cy="0"/>
         </a:xfrm>
       </p:grpSpPr>
+      <p:grpSp>
+        <p:nvGrpSpPr>
+          <p:cNvPr id="16" name="Group 15">
+            <a:extLst>
+              <a:ext uri="{FF2B5EF4-FFF2-40B4-BE49-F238E27FC236}">
+                <a16:creationId xmlns:a16="http://schemas.microsoft.com/office/drawing/2014/main" id="{8C34E712-4355-4D41-A567-1D957EE2EDC9}"/>
+              </a:ext>
+            </a:extLst>
+          </p:cNvPr>
+          <p:cNvGrpSpPr/>
+          <p:nvPr/>
+        </p:nvGrpSpPr>
+        <p:grpSpPr>
+          <a:xfrm>
+            <a:off x="2098938" y="717443"/>
+            <a:ext cx="1072750" cy="1095189"/>
+            <a:chOff x="1032608" y="4750101"/>
+            <a:chExt cx="1072750" cy="1095189"/>
+          </a:xfrm>
+        </p:grpSpPr>
+        <p:pic>
+          <p:nvPicPr>
+            <p:cNvPr id="17" name="Graphic 16">
+              <a:extLst>
+                <a:ext uri="{FF2B5EF4-FFF2-40B4-BE49-F238E27FC236}">
+                  <a16:creationId xmlns:a16="http://schemas.microsoft.com/office/drawing/2014/main" id="{8D458661-299A-A340-B2CF-61064DA79FD8}"/>
+                </a:ext>
+              </a:extLst>
+            </p:cNvPr>
+            <p:cNvPicPr>
+              <a:picLocks noChangeAspect="1"/>
+            </p:cNvPicPr>
+            <p:nvPr/>
+          </p:nvPicPr>
+          <p:blipFill>
+            <a:blip r:embed="rId2">
+              <a:extLst>
+                <a:ext uri="{96DAC541-7B7A-43D3-8B79-37D633B846F1}">
+                  <asvg:svgBlip xmlns:asvg="http://schemas.microsoft.com/office/drawing/2016/SVG/main" r:embed="rId3"/>
+                </a:ext>
+              </a:extLst>
+            </a:blip>
+            <a:stretch>
+              <a:fillRect/>
+            </a:stretch>
+          </p:blipFill>
+          <p:spPr>
+            <a:xfrm>
+              <a:off x="1334033" y="4750101"/>
+              <a:ext cx="469900" cy="469900"/>
+            </a:xfrm>
+            <a:prstGeom prst="rect">
+              <a:avLst/>
+            </a:prstGeom>
+          </p:spPr>
+        </p:pic>
+        <p:sp>
+          <p:nvSpPr>
+            <p:cNvPr id="18" name="TextBox 17">
+              <a:extLst>
+                <a:ext uri="{FF2B5EF4-FFF2-40B4-BE49-F238E27FC236}">
+                  <a16:creationId xmlns:a16="http://schemas.microsoft.com/office/drawing/2014/main" id="{AEDF1D0A-71B1-3C48-A749-7334AF0C8544}"/>
+                </a:ext>
+              </a:extLst>
+            </p:cNvPr>
+            <p:cNvSpPr txBox="1"/>
+            <p:nvPr/>
+          </p:nvSpPr>
+          <p:spPr>
+            <a:xfrm>
+              <a:off x="1032608" y="5322070"/>
+              <a:ext cx="1072750" cy="523220"/>
+            </a:xfrm>
+            <a:prstGeom prst="rect">
+              <a:avLst/>
+            </a:prstGeom>
+            <a:noFill/>
+          </p:spPr>
+          <p:txBody>
+            <a:bodyPr wrap="square" rtlCol="0">
+              <a:spAutoFit/>
+            </a:bodyPr>
+            <a:lstStyle/>
+            <a:p>
+              <a:pPr algn="ctr"/>
+              <a:r>
+                <a:rPr lang="en-US" sz="1400" dirty="0"/>
+                <a:t>Participant</a:t>
+              </a:r>
+            </a:p>
+            <a:p>
+              <a:pPr algn="ctr"/>
+              <a:r>
+                <a:rPr lang="en-US" sz="1400" dirty="0"/>
+                <a:t>User: </a:t>
+              </a:r>
+              <a:r>
+                <a:rPr lang="en-US" sz="1400" dirty="0" err="1"/>
+                <a:t>jdoe</a:t>
+              </a:r>
+              <a:endParaRPr lang="en-US" sz="1400" dirty="0"/>
+            </a:p>
+          </p:txBody>
+        </p:sp>
+      </p:grpSp>
+      <p:grpSp>
+        <p:nvGrpSpPr>
+          <p:cNvPr id="40" name="Group 39">
+            <a:extLst>
+              <a:ext uri="{FF2B5EF4-FFF2-40B4-BE49-F238E27FC236}">
+                <a16:creationId xmlns:a16="http://schemas.microsoft.com/office/drawing/2014/main" id="{F0B61FFE-399B-9342-B3CE-941829A64C87}"/>
+              </a:ext>
+            </a:extLst>
+          </p:cNvPr>
+          <p:cNvGrpSpPr/>
+          <p:nvPr/>
+        </p:nvGrpSpPr>
+        <p:grpSpPr>
+          <a:xfrm>
+            <a:off x="8893475" y="2218455"/>
+            <a:ext cx="1506552" cy="1103275"/>
+            <a:chOff x="7144900" y="5930949"/>
+            <a:chExt cx="1506552" cy="1103275"/>
+          </a:xfrm>
+        </p:grpSpPr>
+        <p:sp>
+          <p:nvSpPr>
+            <p:cNvPr id="41" name="TextBox 40">
+              <a:extLst>
+                <a:ext uri="{FF2B5EF4-FFF2-40B4-BE49-F238E27FC236}">
+                  <a16:creationId xmlns:a16="http://schemas.microsoft.com/office/drawing/2014/main" id="{DBB23839-A4D6-BF4C-AAD2-08E994015AEC}"/>
+                </a:ext>
+              </a:extLst>
+            </p:cNvPr>
+            <p:cNvSpPr txBox="1"/>
+            <p:nvPr/>
+          </p:nvSpPr>
+          <p:spPr>
+            <a:xfrm>
+              <a:off x="7144900" y="6387893"/>
+              <a:ext cx="1506552" cy="646331"/>
+            </a:xfrm>
+            <a:prstGeom prst="rect">
+              <a:avLst/>
+            </a:prstGeom>
+            <a:noFill/>
+          </p:spPr>
+          <p:txBody>
+            <a:bodyPr wrap="square" rtlCol="0">
+              <a:spAutoFit/>
+            </a:bodyPr>
+            <a:lstStyle/>
+            <a:p>
+              <a:pPr algn="ctr"/>
+              <a:r>
+                <a:rPr lang="en-US" sz="1200" dirty="0"/>
+                <a:t>DynamoDB Table</a:t>
+              </a:r>
+            </a:p>
+            <a:p>
+              <a:pPr algn="ctr"/>
+              <a:r>
+                <a:rPr lang="en-US" sz="1200" dirty="0" err="1"/>
+                <a:t>UserTable</a:t>
+              </a:r>
+              <a:endParaRPr lang="en-US" sz="1200" dirty="0"/>
+            </a:p>
+            <a:p>
+              <a:pPr algn="ctr"/>
+              <a:r>
+                <a:rPr lang="en-US" sz="1200" dirty="0"/>
+                <a:t>(resources)</a:t>
+              </a:r>
+            </a:p>
+          </p:txBody>
+        </p:sp>
+        <p:pic>
+          <p:nvPicPr>
+            <p:cNvPr id="42" name="Graphic 41">
+              <a:extLst>
+                <a:ext uri="{FF2B5EF4-FFF2-40B4-BE49-F238E27FC236}">
+                  <a16:creationId xmlns:a16="http://schemas.microsoft.com/office/drawing/2014/main" id="{848E2B4E-56EF-B04A-BE1B-136D9F1067A1}"/>
+                </a:ext>
+              </a:extLst>
+            </p:cNvPr>
+            <p:cNvPicPr>
+              <a:picLocks noChangeAspect="1"/>
+            </p:cNvPicPr>
+            <p:nvPr/>
+          </p:nvPicPr>
+          <p:blipFill>
+            <a:blip r:embed="rId4">
+              <a:extLst>
+                <a:ext uri="{96DAC541-7B7A-43D3-8B79-37D633B846F1}">
+                  <asvg:svgBlip xmlns:asvg="http://schemas.microsoft.com/office/drawing/2016/SVG/main" r:embed="rId5"/>
+                </a:ext>
+              </a:extLst>
+            </a:blip>
+            <a:stretch>
+              <a:fillRect/>
+            </a:stretch>
+          </p:blipFill>
+          <p:spPr>
+            <a:xfrm>
+              <a:off x="7650489" y="5930949"/>
+              <a:ext cx="469900" cy="469900"/>
+            </a:xfrm>
+            <a:prstGeom prst="rect">
+              <a:avLst/>
+            </a:prstGeom>
+          </p:spPr>
+        </p:pic>
+      </p:grpSp>
+      <p:grpSp>
+        <p:nvGrpSpPr>
+          <p:cNvPr id="60" name="Group 59">
+            <a:extLst>
+              <a:ext uri="{FF2B5EF4-FFF2-40B4-BE49-F238E27FC236}">
+                <a16:creationId xmlns:a16="http://schemas.microsoft.com/office/drawing/2014/main" id="{CBEB2874-68CE-5842-BFFC-69DCC4EA2EB2}"/>
+              </a:ext>
+            </a:extLst>
+          </p:cNvPr>
+          <p:cNvGrpSpPr/>
+          <p:nvPr/>
+        </p:nvGrpSpPr>
+        <p:grpSpPr>
+          <a:xfrm>
+            <a:off x="4613302" y="2177857"/>
+            <a:ext cx="2301904" cy="1065869"/>
+            <a:chOff x="1873406" y="1236225"/>
+            <a:chExt cx="2301904" cy="1065869"/>
+          </a:xfrm>
+        </p:grpSpPr>
+        <p:sp>
+          <p:nvSpPr>
+            <p:cNvPr id="61" name="TextBox 60">
+              <a:extLst>
+                <a:ext uri="{FF2B5EF4-FFF2-40B4-BE49-F238E27FC236}">
+                  <a16:creationId xmlns:a16="http://schemas.microsoft.com/office/drawing/2014/main" id="{232F6789-2AF7-2E4E-8696-6FDC3708BC58}"/>
+                </a:ext>
+              </a:extLst>
+            </p:cNvPr>
+            <p:cNvSpPr txBox="1"/>
+            <p:nvPr/>
+          </p:nvSpPr>
+          <p:spPr>
+            <a:xfrm>
+              <a:off x="1873406" y="1994317"/>
+              <a:ext cx="2301904" cy="307777"/>
+            </a:xfrm>
+            <a:prstGeom prst="rect">
+              <a:avLst/>
+            </a:prstGeom>
+            <a:noFill/>
+          </p:spPr>
+          <p:txBody>
+            <a:bodyPr wrap="square" rtlCol="0">
+              <a:spAutoFit/>
+            </a:bodyPr>
+            <a:lstStyle/>
+            <a:p>
+              <a:pPr algn="ctr"/>
+              <a:r>
+                <a:rPr lang="en-US" sz="1400" dirty="0"/>
+                <a:t>Amazon API Gateway</a:t>
+              </a:r>
+            </a:p>
+          </p:txBody>
+        </p:sp>
+        <p:pic>
+          <p:nvPicPr>
+            <p:cNvPr id="62" name="Graphic 61">
+              <a:extLst>
+                <a:ext uri="{FF2B5EF4-FFF2-40B4-BE49-F238E27FC236}">
+                  <a16:creationId xmlns:a16="http://schemas.microsoft.com/office/drawing/2014/main" id="{C22A0B8D-AD51-4E40-8424-E0D96BBAF682}"/>
+                </a:ext>
+              </a:extLst>
+            </p:cNvPr>
+            <p:cNvPicPr>
+              <a:picLocks noChangeAspect="1"/>
+            </p:cNvPicPr>
+            <p:nvPr/>
+          </p:nvPicPr>
+          <p:blipFill>
+            <a:blip r:embed="rId6">
+              <a:extLst>
+                <a:ext uri="{96DAC541-7B7A-43D3-8B79-37D633B846F1}">
+                  <asvg:svgBlip xmlns:asvg="http://schemas.microsoft.com/office/drawing/2016/SVG/main" r:embed="rId7"/>
+                </a:ext>
+              </a:extLst>
+            </a:blip>
+            <a:stretch>
+              <a:fillRect/>
+            </a:stretch>
+          </p:blipFill>
+          <p:spPr>
+            <a:xfrm>
+              <a:off x="2668758" y="1236225"/>
+              <a:ext cx="711200" cy="711200"/>
+            </a:xfrm>
+            <a:prstGeom prst="rect">
+              <a:avLst/>
+            </a:prstGeom>
+          </p:spPr>
+        </p:pic>
+      </p:grpSp>
+      <p:grpSp>
+        <p:nvGrpSpPr>
+          <p:cNvPr id="63" name="Group 62">
+            <a:extLst>
+              <a:ext uri="{FF2B5EF4-FFF2-40B4-BE49-F238E27FC236}">
+                <a16:creationId xmlns:a16="http://schemas.microsoft.com/office/drawing/2014/main" id="{F1AB576E-BD20-164F-B0EF-430197E26EB2}"/>
+              </a:ext>
+            </a:extLst>
+          </p:cNvPr>
+          <p:cNvGrpSpPr/>
+          <p:nvPr/>
+        </p:nvGrpSpPr>
+        <p:grpSpPr>
+          <a:xfrm>
+            <a:off x="3225584" y="751671"/>
+            <a:ext cx="1434269" cy="1014350"/>
+            <a:chOff x="1037832" y="5225263"/>
+            <a:chExt cx="1434269" cy="1014350"/>
+          </a:xfrm>
+        </p:grpSpPr>
+        <p:grpSp>
+          <p:nvGrpSpPr>
+            <p:cNvPr id="64" name="Group 63">
+              <a:extLst>
+                <a:ext uri="{FF2B5EF4-FFF2-40B4-BE49-F238E27FC236}">
+                  <a16:creationId xmlns:a16="http://schemas.microsoft.com/office/drawing/2014/main" id="{4F23E611-D14B-6041-B312-3DC947CFB257}"/>
+                </a:ext>
+              </a:extLst>
+            </p:cNvPr>
+            <p:cNvGrpSpPr/>
+            <p:nvPr/>
+          </p:nvGrpSpPr>
+          <p:grpSpPr>
+            <a:xfrm>
+              <a:off x="1037832" y="5225263"/>
+              <a:ext cx="1434269" cy="1014350"/>
+              <a:chOff x="5567520" y="4311000"/>
+              <a:chExt cx="1072750" cy="758675"/>
+            </a:xfrm>
+          </p:grpSpPr>
+          <p:pic>
+            <p:nvPicPr>
+              <p:cNvPr id="66" name="Graphic 65">
+                <a:extLst>
+                  <a:ext uri="{FF2B5EF4-FFF2-40B4-BE49-F238E27FC236}">
+                    <a16:creationId xmlns:a16="http://schemas.microsoft.com/office/drawing/2014/main" id="{83317973-4178-6345-AF7B-A9CDF8E5528C}"/>
+                  </a:ext>
+                </a:extLst>
+              </p:cNvPr>
+              <p:cNvPicPr>
+                <a:picLocks noChangeAspect="1"/>
+              </p:cNvPicPr>
+              <p:nvPr/>
+            </p:nvPicPr>
+            <p:blipFill>
+              <a:blip r:embed="rId8">
+                <a:extLst>
+                  <a:ext uri="{96DAC541-7B7A-43D3-8B79-37D633B846F1}">
+                    <asvg:svgBlip xmlns:asvg="http://schemas.microsoft.com/office/drawing/2016/SVG/main" r:embed="rId9"/>
+                  </a:ext>
+                </a:extLst>
+              </a:blip>
+              <a:stretch>
+                <a:fillRect/>
+              </a:stretch>
+            </p:blipFill>
+            <p:spPr>
+              <a:xfrm>
+                <a:off x="5868945" y="4311000"/>
+                <a:ext cx="469900" cy="469900"/>
+              </a:xfrm>
+              <a:prstGeom prst="rect">
+                <a:avLst/>
+              </a:prstGeom>
+            </p:spPr>
+          </p:pic>
+          <p:sp>
+            <p:nvSpPr>
+              <p:cNvPr id="67" name="TextBox 66">
+                <a:extLst>
+                  <a:ext uri="{FF2B5EF4-FFF2-40B4-BE49-F238E27FC236}">
+                    <a16:creationId xmlns:a16="http://schemas.microsoft.com/office/drawing/2014/main" id="{D58F38AF-FE13-0E49-A6FC-64DEFEC3C4C7}"/>
+                  </a:ext>
+                </a:extLst>
+              </p:cNvPr>
+              <p:cNvSpPr txBox="1"/>
+              <p:nvPr/>
+            </p:nvSpPr>
+            <p:spPr>
+              <a:xfrm>
+                <a:off x="5567520" y="4839476"/>
+                <a:ext cx="1072750" cy="230199"/>
+              </a:xfrm>
+              <a:prstGeom prst="rect">
+                <a:avLst/>
+              </a:prstGeom>
+              <a:noFill/>
+            </p:spPr>
+            <p:txBody>
+              <a:bodyPr wrap="square" rtlCol="0">
+                <a:spAutoFit/>
+              </a:bodyPr>
+              <a:lstStyle/>
+              <a:p>
+                <a:pPr algn="ctr"/>
+                <a:r>
+                  <a:rPr lang="en-US" sz="1400" dirty="0" err="1"/>
+                  <a:t>webapp</a:t>
+                </a:r>
+                <a:endParaRPr lang="en-US" sz="1400" dirty="0"/>
+              </a:p>
+            </p:txBody>
+          </p:sp>
+        </p:grpSp>
+        <p:pic>
+          <p:nvPicPr>
+            <p:cNvPr id="65" name="Graphic 64">
+              <a:extLst>
+                <a:ext uri="{FF2B5EF4-FFF2-40B4-BE49-F238E27FC236}">
+                  <a16:creationId xmlns:a16="http://schemas.microsoft.com/office/drawing/2014/main" id="{D8584359-5191-8E4C-BB23-152CB6513BD0}"/>
+                </a:ext>
+              </a:extLst>
+            </p:cNvPr>
+            <p:cNvPicPr>
+              <a:picLocks noChangeAspect="1"/>
+            </p:cNvPicPr>
+            <p:nvPr/>
+          </p:nvPicPr>
+          <p:blipFill>
+            <a:blip r:embed="rId10">
+              <a:extLst>
+                <a:ext uri="{96DAC541-7B7A-43D3-8B79-37D633B846F1}">
+                  <asvg:svgBlip xmlns:asvg="http://schemas.microsoft.com/office/drawing/2016/SVG/main" r:embed="rId11"/>
+                </a:ext>
+              </a:extLst>
+            </a:blip>
+            <a:stretch>
+              <a:fillRect/>
+            </a:stretch>
+          </p:blipFill>
+          <p:spPr>
+            <a:xfrm>
+              <a:off x="1636852" y="5335863"/>
+              <a:ext cx="235632" cy="235632"/>
+            </a:xfrm>
+            <a:prstGeom prst="rect">
+              <a:avLst/>
+            </a:prstGeom>
+          </p:spPr>
+        </p:pic>
+      </p:grpSp>
+      <p:grpSp>
+        <p:nvGrpSpPr>
+          <p:cNvPr id="68" name="Group 67">
+            <a:extLst>
+              <a:ext uri="{FF2B5EF4-FFF2-40B4-BE49-F238E27FC236}">
+                <a16:creationId xmlns:a16="http://schemas.microsoft.com/office/drawing/2014/main" id="{E86B288A-50C3-EF47-93E3-2AB434694DDD}"/>
+              </a:ext>
+            </a:extLst>
+          </p:cNvPr>
+          <p:cNvGrpSpPr/>
+          <p:nvPr/>
+        </p:nvGrpSpPr>
+        <p:grpSpPr>
+          <a:xfrm>
+            <a:off x="4613302" y="697326"/>
+            <a:ext cx="2301904" cy="1070846"/>
+            <a:chOff x="2825870" y="6776178"/>
+            <a:chExt cx="2301904" cy="1070846"/>
+          </a:xfrm>
+        </p:grpSpPr>
+        <p:sp>
+          <p:nvSpPr>
+            <p:cNvPr id="69" name="TextBox 68">
+              <a:extLst>
+                <a:ext uri="{FF2B5EF4-FFF2-40B4-BE49-F238E27FC236}">
+                  <a16:creationId xmlns:a16="http://schemas.microsoft.com/office/drawing/2014/main" id="{B70EBC16-37D3-4248-A685-9115D0BC4995}"/>
+                </a:ext>
+              </a:extLst>
+            </p:cNvPr>
+            <p:cNvSpPr txBox="1"/>
+            <p:nvPr/>
+          </p:nvSpPr>
+          <p:spPr>
+            <a:xfrm>
+              <a:off x="2825870" y="7539247"/>
+              <a:ext cx="2301904" cy="307777"/>
+            </a:xfrm>
+            <a:prstGeom prst="rect">
+              <a:avLst/>
+            </a:prstGeom>
+            <a:noFill/>
+          </p:spPr>
+          <p:txBody>
+            <a:bodyPr wrap="square" rtlCol="0">
+              <a:spAutoFit/>
+            </a:bodyPr>
+            <a:lstStyle/>
+            <a:p>
+              <a:pPr algn="ctr"/>
+              <a:r>
+                <a:rPr lang="en-US" sz="1400" dirty="0"/>
+                <a:t>Amazon Cognito</a:t>
+              </a:r>
+            </a:p>
+          </p:txBody>
+        </p:sp>
+        <p:pic>
+          <p:nvPicPr>
+            <p:cNvPr id="70" name="Graphic 69">
+              <a:extLst>
+                <a:ext uri="{FF2B5EF4-FFF2-40B4-BE49-F238E27FC236}">
+                  <a16:creationId xmlns:a16="http://schemas.microsoft.com/office/drawing/2014/main" id="{ADD9463E-396D-CC43-B400-8A2CBDC40313}"/>
+                </a:ext>
+              </a:extLst>
+            </p:cNvPr>
+            <p:cNvPicPr>
+              <a:picLocks noChangeAspect="1"/>
+            </p:cNvPicPr>
+            <p:nvPr/>
+          </p:nvPicPr>
+          <p:blipFill>
+            <a:blip r:embed="rId12">
+              <a:extLst>
+                <a:ext uri="{96DAC541-7B7A-43D3-8B79-37D633B846F1}">
+                  <asvg:svgBlip xmlns:asvg="http://schemas.microsoft.com/office/drawing/2016/SVG/main" r:embed="rId13"/>
+                </a:ext>
+              </a:extLst>
+            </a:blip>
+            <a:stretch>
+              <a:fillRect/>
+            </a:stretch>
+          </p:blipFill>
+          <p:spPr>
+            <a:xfrm>
+              <a:off x="3621222" y="6776178"/>
+              <a:ext cx="711200" cy="711200"/>
+            </a:xfrm>
+            <a:prstGeom prst="rect">
+              <a:avLst/>
+            </a:prstGeom>
+          </p:spPr>
+        </p:pic>
+      </p:grpSp>
+      <p:grpSp>
+        <p:nvGrpSpPr>
+          <p:cNvPr id="117" name="Group 116">
+            <a:extLst>
+              <a:ext uri="{FF2B5EF4-FFF2-40B4-BE49-F238E27FC236}">
+                <a16:creationId xmlns:a16="http://schemas.microsoft.com/office/drawing/2014/main" id="{0FF3902E-DCE4-9341-8704-6353F73496E0}"/>
+              </a:ext>
+            </a:extLst>
+          </p:cNvPr>
+          <p:cNvGrpSpPr/>
+          <p:nvPr/>
+        </p:nvGrpSpPr>
+        <p:grpSpPr>
+          <a:xfrm>
+            <a:off x="4077363" y="3870647"/>
+            <a:ext cx="2301904" cy="995604"/>
+            <a:chOff x="4706563" y="1714966"/>
+            <a:chExt cx="2301904" cy="995604"/>
+          </a:xfrm>
+        </p:grpSpPr>
+        <p:sp>
+          <p:nvSpPr>
+            <p:cNvPr id="115" name="TextBox 114">
+              <a:extLst>
+                <a:ext uri="{FF2B5EF4-FFF2-40B4-BE49-F238E27FC236}">
+                  <a16:creationId xmlns:a16="http://schemas.microsoft.com/office/drawing/2014/main" id="{CD10231F-79C6-794E-8FA5-788072DF2638}"/>
+                </a:ext>
+              </a:extLst>
+            </p:cNvPr>
+            <p:cNvSpPr txBox="1"/>
+            <p:nvPr/>
+          </p:nvSpPr>
+          <p:spPr>
+            <a:xfrm>
+              <a:off x="4706563" y="2402793"/>
+              <a:ext cx="2301904" cy="307777"/>
+            </a:xfrm>
+            <a:prstGeom prst="rect">
+              <a:avLst/>
+            </a:prstGeom>
+            <a:noFill/>
+          </p:spPr>
+          <p:txBody>
+            <a:bodyPr wrap="square" rtlCol="0">
+              <a:spAutoFit/>
+            </a:bodyPr>
+            <a:lstStyle/>
+            <a:p>
+              <a:pPr algn="ctr"/>
+              <a:r>
+                <a:rPr lang="en-US" sz="1400" dirty="0"/>
+                <a:t>AWS IoT Core</a:t>
+              </a:r>
+            </a:p>
+          </p:txBody>
+        </p:sp>
+        <p:pic>
+          <p:nvPicPr>
+            <p:cNvPr id="116" name="Graphic 115">
+              <a:extLst>
+                <a:ext uri="{FF2B5EF4-FFF2-40B4-BE49-F238E27FC236}">
+                  <a16:creationId xmlns:a16="http://schemas.microsoft.com/office/drawing/2014/main" id="{36D652FE-B5B1-5041-B558-A1A6A82BF56D}"/>
+                </a:ext>
+              </a:extLst>
+            </p:cNvPr>
+            <p:cNvPicPr>
+              <a:picLocks noChangeAspect="1"/>
+            </p:cNvPicPr>
+            <p:nvPr/>
+          </p:nvPicPr>
+          <p:blipFill>
+            <a:blip r:embed="rId14">
+              <a:extLst>
+                <a:ext uri="{96DAC541-7B7A-43D3-8B79-37D633B846F1}">
+                  <asvg:svgBlip xmlns:asvg="http://schemas.microsoft.com/office/drawing/2016/SVG/main" r:embed="rId15"/>
+                </a:ext>
+              </a:extLst>
+            </a:blip>
+            <a:stretch>
+              <a:fillRect/>
+            </a:stretch>
+          </p:blipFill>
+          <p:spPr>
+            <a:xfrm>
+              <a:off x="5501915" y="1714966"/>
+              <a:ext cx="711200" cy="711200"/>
+            </a:xfrm>
+            <a:prstGeom prst="rect">
+              <a:avLst/>
+            </a:prstGeom>
+          </p:spPr>
+        </p:pic>
+      </p:grpSp>
+      <p:sp>
+        <p:nvSpPr>
+          <p:cNvPr id="139" name="Rectangle 138">
+            <a:extLst>
+              <a:ext uri="{FF2B5EF4-FFF2-40B4-BE49-F238E27FC236}">
+                <a16:creationId xmlns:a16="http://schemas.microsoft.com/office/drawing/2014/main" id="{7D9AAE69-26C9-5D4A-B146-692797195CA9}"/>
+              </a:ext>
+            </a:extLst>
+          </p:cNvPr>
+          <p:cNvSpPr/>
+          <p:nvPr/>
+        </p:nvSpPr>
+        <p:spPr>
+          <a:xfrm>
+            <a:off x="4630861" y="260056"/>
+            <a:ext cx="5582159" cy="6251275"/>
+          </a:xfrm>
+          <a:prstGeom prst="rect">
+            <a:avLst/>
+          </a:prstGeom>
+          <a:noFill/>
+          <a:ln w="12700">
+            <a:solidFill>
+              <a:schemeClr val="tx1"/>
+            </a:solidFill>
+          </a:ln>
+        </p:spPr>
+        <p:style>
+          <a:lnRef idx="2">
+            <a:schemeClr val="accent1">
+              <a:shade val="50000"/>
+            </a:schemeClr>
+          </a:lnRef>
+          <a:fillRef idx="1">
+            <a:schemeClr val="accent1"/>
+          </a:fillRef>
+          <a:effectRef idx="0">
+            <a:schemeClr val="accent1"/>
+          </a:effectRef>
+          <a:fontRef idx="minor">
+            <a:schemeClr val="lt1"/>
+          </a:fontRef>
+        </p:style>
+        <p:txBody>
+          <a:bodyPr rot="0" spcFirstLastPara="0" vertOverflow="overflow" horzOverflow="overflow" vert="horz" wrap="square" lIns="457200" tIns="91440" rIns="91440" bIns="45720" numCol="1" spcCol="0" rtlCol="0" fromWordArt="0" anchor="t" anchorCtr="0" forceAA="0" compatLnSpc="1">
+            <a:prstTxWarp prst="textNoShape">
+              <a:avLst/>
+            </a:prstTxWarp>
+            <a:noAutofit/>
+          </a:bodyPr>
+          <a:lstStyle/>
+          <a:p>
+            <a:pPr algn="l"/>
+            <a:r>
+              <a:rPr lang="en-US" sz="1200" dirty="0">
+                <a:solidFill>
+                  <a:sysClr val="windowText" lastClr="000000"/>
+                </a:solidFill>
+              </a:rPr>
+              <a:t>AWS Cloud</a:t>
+            </a:r>
+          </a:p>
+        </p:txBody>
+      </p:sp>
+      <p:pic>
+        <p:nvPicPr>
+          <p:cNvPr id="140" name="Graphic 139">
+            <a:extLst>
+              <a:ext uri="{FF2B5EF4-FFF2-40B4-BE49-F238E27FC236}">
+                <a16:creationId xmlns:a16="http://schemas.microsoft.com/office/drawing/2014/main" id="{A6F8DB4C-33BB-9246-93CE-C80173115542}"/>
+              </a:ext>
+            </a:extLst>
+          </p:cNvPr>
+          <p:cNvPicPr>
+            <a:picLocks noChangeAspect="1"/>
+          </p:cNvPicPr>
+          <p:nvPr/>
+        </p:nvPicPr>
+        <p:blipFill>
+          <a:blip r:embed="rId16">
+            <a:extLst>
+              <a:ext uri="{96DAC541-7B7A-43D3-8B79-37D633B846F1}">
+                <asvg:svgBlip xmlns:asvg="http://schemas.microsoft.com/office/drawing/2016/SVG/main" r:embed="rId17"/>
+              </a:ext>
+            </a:extLst>
+          </a:blip>
+          <a:stretch>
+            <a:fillRect/>
+          </a:stretch>
+        </p:blipFill>
+        <p:spPr>
+          <a:xfrm>
+            <a:off x="4630862" y="260057"/>
+            <a:ext cx="330200" cy="330200"/>
+          </a:xfrm>
+          <a:prstGeom prst="rect">
+            <a:avLst/>
+          </a:prstGeom>
+        </p:spPr>
+      </p:pic>
+      <p:sp>
+        <p:nvSpPr>
+          <p:cNvPr id="2" name="TextBox 1">
+            <a:extLst>
+              <a:ext uri="{FF2B5EF4-FFF2-40B4-BE49-F238E27FC236}">
+                <a16:creationId xmlns:a16="http://schemas.microsoft.com/office/drawing/2014/main" id="{D106182E-52F2-9349-8EF7-66DFAA6268A1}"/>
+              </a:ext>
+            </a:extLst>
+          </p:cNvPr>
+          <p:cNvSpPr txBox="1"/>
+          <p:nvPr/>
+        </p:nvSpPr>
+        <p:spPr>
+          <a:xfrm>
+            <a:off x="201721" y="6155696"/>
+            <a:ext cx="1021433" cy="523220"/>
+          </a:xfrm>
+          <a:prstGeom prst="rect">
+            <a:avLst/>
+          </a:prstGeom>
+          <a:noFill/>
+        </p:spPr>
+        <p:txBody>
+          <a:bodyPr wrap="none" rtlCol="0">
+            <a:spAutoFit/>
+          </a:bodyPr>
+          <a:lstStyle/>
+          <a:p>
+            <a:r>
+              <a:rPr lang="en-US" sz="2800" b="1" dirty="0"/>
+              <a:t>LAB 3</a:t>
+            </a:r>
+          </a:p>
+        </p:txBody>
+      </p:sp>
+      <p:grpSp>
+        <p:nvGrpSpPr>
+          <p:cNvPr id="5" name="Group 4">
+            <a:extLst>
+              <a:ext uri="{FF2B5EF4-FFF2-40B4-BE49-F238E27FC236}">
+                <a16:creationId xmlns:a16="http://schemas.microsoft.com/office/drawing/2014/main" id="{D3616CCB-31C0-DC4D-8006-4EF0D3BBDA77}"/>
+              </a:ext>
+            </a:extLst>
+          </p:cNvPr>
+          <p:cNvGrpSpPr/>
+          <p:nvPr/>
+        </p:nvGrpSpPr>
+        <p:grpSpPr>
+          <a:xfrm>
+            <a:off x="7299715" y="717443"/>
+            <a:ext cx="1942902" cy="1095189"/>
+            <a:chOff x="7289667" y="717443"/>
+            <a:chExt cx="1942902" cy="1095189"/>
+          </a:xfrm>
+        </p:grpSpPr>
+        <p:pic>
+          <p:nvPicPr>
+            <p:cNvPr id="46" name="Graphic 45">
+              <a:extLst>
+                <a:ext uri="{FF2B5EF4-FFF2-40B4-BE49-F238E27FC236}">
+                  <a16:creationId xmlns:a16="http://schemas.microsoft.com/office/drawing/2014/main" id="{2595A840-3665-7346-961C-F66ADCDD95A5}"/>
+                </a:ext>
+              </a:extLst>
+            </p:cNvPr>
+            <p:cNvPicPr>
+              <a:picLocks noChangeAspect="1"/>
+            </p:cNvPicPr>
+            <p:nvPr/>
+          </p:nvPicPr>
+          <p:blipFill>
+            <a:blip r:embed="rId18">
+              <a:extLst>
+                <a:ext uri="{96DAC541-7B7A-43D3-8B79-37D633B846F1}">
+                  <asvg:svgBlip xmlns:asvg="http://schemas.microsoft.com/office/drawing/2016/SVG/main" r:embed="rId19"/>
+                </a:ext>
+              </a:extLst>
+            </a:blip>
+            <a:stretch>
+              <a:fillRect/>
+            </a:stretch>
+          </p:blipFill>
+          <p:spPr>
+            <a:xfrm flipH="1">
+              <a:off x="8019325" y="717443"/>
+              <a:ext cx="483586" cy="469900"/>
+            </a:xfrm>
+            <a:prstGeom prst="rect">
+              <a:avLst/>
+            </a:prstGeom>
+          </p:spPr>
+        </p:pic>
+        <p:sp>
+          <p:nvSpPr>
+            <p:cNvPr id="47" name="TextBox 46">
+              <a:extLst>
+                <a:ext uri="{FF2B5EF4-FFF2-40B4-BE49-F238E27FC236}">
+                  <a16:creationId xmlns:a16="http://schemas.microsoft.com/office/drawing/2014/main" id="{04162043-BD16-0146-B0F0-B6E3CF629B54}"/>
+                </a:ext>
+              </a:extLst>
+            </p:cNvPr>
+            <p:cNvSpPr txBox="1"/>
+            <p:nvPr/>
+          </p:nvSpPr>
+          <p:spPr>
+            <a:xfrm>
+              <a:off x="7289667" y="1289412"/>
+              <a:ext cx="1942902" cy="523220"/>
+            </a:xfrm>
+            <a:prstGeom prst="rect">
+              <a:avLst/>
+            </a:prstGeom>
+            <a:noFill/>
+          </p:spPr>
+          <p:txBody>
+            <a:bodyPr wrap="square" rtlCol="0">
+              <a:spAutoFit/>
+            </a:bodyPr>
+            <a:lstStyle/>
+            <a:p>
+              <a:pPr algn="ctr"/>
+              <a:r>
+                <a:rPr lang="en-US" sz="1400" dirty="0">
+                  <a:solidFill>
+                    <a:srgbClr val="232F3E"/>
+                  </a:solidFill>
+                </a:rPr>
+                <a:t>User Pool</a:t>
+              </a:r>
+            </a:p>
+            <a:p>
+              <a:pPr algn="ctr"/>
+              <a:r>
+                <a:rPr lang="en-US" sz="1100" dirty="0">
+                  <a:solidFill>
+                    <a:srgbClr val="232F3E"/>
+                  </a:solidFill>
+                </a:rPr>
+                <a:t>(user, password, attributes</a:t>
+              </a:r>
+              <a:r>
+                <a:rPr lang="en-US" sz="1400" dirty="0">
+                  <a:solidFill>
+                    <a:srgbClr val="232F3E"/>
+                  </a:solidFill>
+                </a:rPr>
+                <a:t>)</a:t>
+              </a:r>
+            </a:p>
+          </p:txBody>
+        </p:sp>
+      </p:grpSp>
+      <p:cxnSp>
+        <p:nvCxnSpPr>
+          <p:cNvPr id="49" name="Straight Arrow Connector 48">
+            <a:extLst>
+              <a:ext uri="{FF2B5EF4-FFF2-40B4-BE49-F238E27FC236}">
+                <a16:creationId xmlns:a16="http://schemas.microsoft.com/office/drawing/2014/main" id="{BFCAB45A-E681-2E40-8597-620BC74D5A88}"/>
+              </a:ext>
+            </a:extLst>
+          </p:cNvPr>
+          <p:cNvCxnSpPr>
+            <a:cxnSpLocks/>
+          </p:cNvCxnSpPr>
+          <p:nvPr/>
+        </p:nvCxnSpPr>
+        <p:spPr>
+          <a:xfrm>
+            <a:off x="2958511" y="1063293"/>
+            <a:ext cx="494670" cy="0"/>
+          </a:xfrm>
+          <a:prstGeom prst="straightConnector1">
+            <a:avLst/>
+          </a:prstGeom>
+          <a:ln w="12700">
+            <a:solidFill>
+              <a:srgbClr val="545B64"/>
+            </a:solidFill>
+            <a:headEnd type="arrow" w="med" len="sm"/>
+            <a:tailEnd type="arrow" w="med" len="sm"/>
+          </a:ln>
+        </p:spPr>
+        <p:style>
+          <a:lnRef idx="1">
+            <a:schemeClr val="accent1"/>
+          </a:lnRef>
+          <a:fillRef idx="0">
+            <a:schemeClr val="accent1"/>
+          </a:fillRef>
+          <a:effectRef idx="0">
+            <a:schemeClr val="accent1"/>
+          </a:effectRef>
+          <a:fontRef idx="minor">
+            <a:schemeClr val="tx1"/>
+          </a:fontRef>
+        </p:style>
+      </p:cxnSp>
+      <p:cxnSp>
+        <p:nvCxnSpPr>
+          <p:cNvPr id="50" name="Straight Arrow Connector 49">
+            <a:extLst>
+              <a:ext uri="{FF2B5EF4-FFF2-40B4-BE49-F238E27FC236}">
+                <a16:creationId xmlns:a16="http://schemas.microsoft.com/office/drawing/2014/main" id="{95A09E91-9FDE-5644-AF66-FAAD0C526249}"/>
+              </a:ext>
+            </a:extLst>
+          </p:cNvPr>
+          <p:cNvCxnSpPr>
+            <a:cxnSpLocks/>
+          </p:cNvCxnSpPr>
+          <p:nvPr/>
+        </p:nvCxnSpPr>
+        <p:spPr>
+          <a:xfrm>
+            <a:off x="4310743" y="1067376"/>
+            <a:ext cx="1008761" cy="0"/>
+          </a:xfrm>
+          <a:prstGeom prst="straightConnector1">
+            <a:avLst/>
+          </a:prstGeom>
+          <a:ln w="12700">
+            <a:solidFill>
+              <a:srgbClr val="545B64"/>
+            </a:solidFill>
+            <a:headEnd type="arrow" w="med" len="sm"/>
+            <a:tailEnd type="arrow" w="med" len="sm"/>
+          </a:ln>
+        </p:spPr>
+        <p:style>
+          <a:lnRef idx="1">
+            <a:schemeClr val="accent1"/>
+          </a:lnRef>
+          <a:fillRef idx="0">
+            <a:schemeClr val="accent1"/>
+          </a:fillRef>
+          <a:effectRef idx="0">
+            <a:schemeClr val="accent1"/>
+          </a:effectRef>
+          <a:fontRef idx="minor">
+            <a:schemeClr val="tx1"/>
+          </a:fontRef>
+        </p:style>
+      </p:cxnSp>
+      <p:grpSp>
+        <p:nvGrpSpPr>
+          <p:cNvPr id="10" name="Group 9">
+            <a:extLst>
+              <a:ext uri="{FF2B5EF4-FFF2-40B4-BE49-F238E27FC236}">
+                <a16:creationId xmlns:a16="http://schemas.microsoft.com/office/drawing/2014/main" id="{B74918C8-29B8-4E45-9B32-85C1BD5ECD00}"/>
+              </a:ext>
+            </a:extLst>
+          </p:cNvPr>
+          <p:cNvGrpSpPr/>
+          <p:nvPr/>
+        </p:nvGrpSpPr>
+        <p:grpSpPr>
+          <a:xfrm>
+            <a:off x="6493868" y="2288531"/>
+            <a:ext cx="2301904" cy="864905"/>
+            <a:chOff x="8961043" y="1836049"/>
+            <a:chExt cx="2301904" cy="864905"/>
+          </a:xfrm>
+        </p:grpSpPr>
+        <p:sp>
+          <p:nvSpPr>
+            <p:cNvPr id="55" name="TextBox 54">
+              <a:extLst>
+                <a:ext uri="{FF2B5EF4-FFF2-40B4-BE49-F238E27FC236}">
+                  <a16:creationId xmlns:a16="http://schemas.microsoft.com/office/drawing/2014/main" id="{706D6FED-6219-674B-8387-3D35E631C760}"/>
+                </a:ext>
+              </a:extLst>
+            </p:cNvPr>
+            <p:cNvSpPr txBox="1"/>
+            <p:nvPr/>
+          </p:nvSpPr>
+          <p:spPr>
+            <a:xfrm>
+              <a:off x="8961043" y="2393177"/>
+              <a:ext cx="2301904" cy="307777"/>
+            </a:xfrm>
+            <a:prstGeom prst="rect">
+              <a:avLst/>
+            </a:prstGeom>
+            <a:noFill/>
+          </p:spPr>
+          <p:txBody>
+            <a:bodyPr wrap="square" rtlCol="0">
+              <a:spAutoFit/>
+            </a:bodyPr>
+            <a:lstStyle/>
+            <a:p>
+              <a:pPr algn="ctr"/>
+              <a:r>
+                <a:rPr lang="en-US" sz="1400" dirty="0"/>
+                <a:t>/</a:t>
+              </a:r>
+              <a:r>
+                <a:rPr lang="en-US" sz="1400"/>
+                <a:t>getResources</a:t>
+              </a:r>
+              <a:endParaRPr lang="en-US" sz="1400" dirty="0"/>
+            </a:p>
+          </p:txBody>
+        </p:sp>
+        <p:pic>
+          <p:nvPicPr>
+            <p:cNvPr id="56" name="Graphic 55">
+              <a:extLst>
+                <a:ext uri="{FF2B5EF4-FFF2-40B4-BE49-F238E27FC236}">
+                  <a16:creationId xmlns:a16="http://schemas.microsoft.com/office/drawing/2014/main" id="{ECA2DD2C-43EE-274E-8C05-67AB660BEE41}"/>
+                </a:ext>
+              </a:extLst>
+            </p:cNvPr>
+            <p:cNvPicPr>
+              <a:picLocks noChangeAspect="1"/>
+            </p:cNvPicPr>
+            <p:nvPr/>
+          </p:nvPicPr>
+          <p:blipFill>
+            <a:blip r:embed="rId20">
+              <a:extLst>
+                <a:ext uri="{96DAC541-7B7A-43D3-8B79-37D633B846F1}">
+                  <asvg:svgBlip xmlns:asvg="http://schemas.microsoft.com/office/drawing/2016/SVG/main" r:embed="rId21"/>
+                </a:ext>
+              </a:extLst>
+            </a:blip>
+            <a:stretch>
+              <a:fillRect/>
+            </a:stretch>
+          </p:blipFill>
+          <p:spPr>
+            <a:xfrm>
+              <a:off x="9877045" y="1836049"/>
+              <a:ext cx="469900" cy="469900"/>
+            </a:xfrm>
+            <a:prstGeom prst="rect">
+              <a:avLst/>
+            </a:prstGeom>
+          </p:spPr>
+        </p:pic>
+      </p:grpSp>
+      <p:cxnSp>
+        <p:nvCxnSpPr>
+          <p:cNvPr id="57" name="Straight Arrow Connector 56">
+            <a:extLst>
+              <a:ext uri="{FF2B5EF4-FFF2-40B4-BE49-F238E27FC236}">
+                <a16:creationId xmlns:a16="http://schemas.microsoft.com/office/drawing/2014/main" id="{A24973CE-3F7F-E046-8DCD-4D2E200C5D99}"/>
+              </a:ext>
+            </a:extLst>
+          </p:cNvPr>
+          <p:cNvCxnSpPr>
+            <a:cxnSpLocks/>
+          </p:cNvCxnSpPr>
+          <p:nvPr/>
+        </p:nvCxnSpPr>
+        <p:spPr>
+          <a:xfrm>
+            <a:off x="6216404" y="1066900"/>
+            <a:ext cx="1701697" cy="0"/>
+          </a:xfrm>
+          <a:prstGeom prst="straightConnector1">
+            <a:avLst/>
+          </a:prstGeom>
+          <a:ln w="12700">
+            <a:solidFill>
+              <a:srgbClr val="545B64"/>
+            </a:solidFill>
+            <a:headEnd type="arrow" w="med" len="sm"/>
+            <a:tailEnd type="arrow" w="med" len="sm"/>
+          </a:ln>
+        </p:spPr>
+        <p:style>
+          <a:lnRef idx="1">
+            <a:schemeClr val="accent1"/>
+          </a:lnRef>
+          <a:fillRef idx="0">
+            <a:schemeClr val="accent1"/>
+          </a:fillRef>
+          <a:effectRef idx="0">
+            <a:schemeClr val="accent1"/>
+          </a:effectRef>
+          <a:fontRef idx="minor">
+            <a:schemeClr val="tx1"/>
+          </a:fontRef>
+        </p:style>
+      </p:cxnSp>
+      <p:grpSp>
+        <p:nvGrpSpPr>
+          <p:cNvPr id="11" name="Group 10">
+            <a:extLst>
+              <a:ext uri="{FF2B5EF4-FFF2-40B4-BE49-F238E27FC236}">
+                <a16:creationId xmlns:a16="http://schemas.microsoft.com/office/drawing/2014/main" id="{027A892C-833C-9342-BDA7-E97D0ED9D58D}"/>
+              </a:ext>
+            </a:extLst>
+          </p:cNvPr>
+          <p:cNvGrpSpPr/>
+          <p:nvPr/>
+        </p:nvGrpSpPr>
+        <p:grpSpPr>
+          <a:xfrm>
+            <a:off x="5605283" y="3870646"/>
+            <a:ext cx="2301904" cy="1279186"/>
+            <a:chOff x="6747337" y="3990057"/>
+            <a:chExt cx="2301904" cy="1279186"/>
+          </a:xfrm>
+        </p:grpSpPr>
+        <p:sp>
+          <p:nvSpPr>
+            <p:cNvPr id="59" name="TextBox 58">
+              <a:extLst>
+                <a:ext uri="{FF2B5EF4-FFF2-40B4-BE49-F238E27FC236}">
+                  <a16:creationId xmlns:a16="http://schemas.microsoft.com/office/drawing/2014/main" id="{C3E5ECEC-82A4-9549-8089-1CE993F1F35C}"/>
+                </a:ext>
+              </a:extLst>
+            </p:cNvPr>
+            <p:cNvSpPr txBox="1"/>
+            <p:nvPr/>
+          </p:nvSpPr>
+          <p:spPr>
+            <a:xfrm>
+              <a:off x="6747337" y="4746023"/>
+              <a:ext cx="2301904" cy="523220"/>
+            </a:xfrm>
+            <a:prstGeom prst="rect">
+              <a:avLst/>
+            </a:prstGeom>
+            <a:noFill/>
+          </p:spPr>
+          <p:txBody>
+            <a:bodyPr wrap="square" rtlCol="0">
+              <a:spAutoFit/>
+            </a:bodyPr>
+            <a:lstStyle/>
+            <a:p>
+              <a:pPr algn="ctr"/>
+              <a:r>
+                <a:rPr lang="en-US" sz="1400" dirty="0"/>
+                <a:t>AWS IAM</a:t>
+              </a:r>
+            </a:p>
+            <a:p>
+              <a:pPr algn="ctr"/>
+              <a:r>
+                <a:rPr lang="en-US" sz="1400" dirty="0"/>
+                <a:t>User Account</a:t>
+              </a:r>
+            </a:p>
+          </p:txBody>
+        </p:sp>
+        <p:pic>
+          <p:nvPicPr>
+            <p:cNvPr id="71" name="Graphic 70">
+              <a:extLst>
+                <a:ext uri="{FF2B5EF4-FFF2-40B4-BE49-F238E27FC236}">
+                  <a16:creationId xmlns:a16="http://schemas.microsoft.com/office/drawing/2014/main" id="{3019DD26-886A-E94A-A1E8-29CEB089394A}"/>
+                </a:ext>
+              </a:extLst>
+            </p:cNvPr>
+            <p:cNvPicPr>
+              <a:picLocks noChangeAspect="1"/>
+            </p:cNvPicPr>
+            <p:nvPr/>
+          </p:nvPicPr>
+          <p:blipFill>
+            <a:blip r:embed="rId22">
+              <a:extLst>
+                <a:ext uri="{96DAC541-7B7A-43D3-8B79-37D633B846F1}">
+                  <asvg:svgBlip xmlns:asvg="http://schemas.microsoft.com/office/drawing/2016/SVG/main" r:embed="rId23"/>
+                </a:ext>
+              </a:extLst>
+            </a:blip>
+            <a:stretch>
+              <a:fillRect/>
+            </a:stretch>
+          </p:blipFill>
+          <p:spPr>
+            <a:xfrm>
+              <a:off x="7542689" y="3990057"/>
+              <a:ext cx="711200" cy="711200"/>
+            </a:xfrm>
+            <a:prstGeom prst="rect">
+              <a:avLst/>
+            </a:prstGeom>
+          </p:spPr>
+        </p:pic>
+      </p:grpSp>
+      <p:grpSp>
+        <p:nvGrpSpPr>
+          <p:cNvPr id="12" name="Group 11">
+            <a:extLst>
+              <a:ext uri="{FF2B5EF4-FFF2-40B4-BE49-F238E27FC236}">
+                <a16:creationId xmlns:a16="http://schemas.microsoft.com/office/drawing/2014/main" id="{BA410430-98FA-994E-8E2D-F471610439EB}"/>
+              </a:ext>
+            </a:extLst>
+          </p:cNvPr>
+          <p:cNvGrpSpPr/>
+          <p:nvPr/>
+        </p:nvGrpSpPr>
+        <p:grpSpPr>
+          <a:xfrm>
+            <a:off x="7076353" y="3870645"/>
+            <a:ext cx="2301904" cy="1064540"/>
+            <a:chOff x="1779533" y="1208977"/>
+            <a:chExt cx="2301904" cy="1064540"/>
+          </a:xfrm>
+        </p:grpSpPr>
+        <p:sp>
+          <p:nvSpPr>
+            <p:cNvPr id="72" name="TextBox 71">
+              <a:extLst>
+                <a:ext uri="{FF2B5EF4-FFF2-40B4-BE49-F238E27FC236}">
+                  <a16:creationId xmlns:a16="http://schemas.microsoft.com/office/drawing/2014/main" id="{BD85A212-62DE-3A40-BAE0-79095843E4FF}"/>
+                </a:ext>
+              </a:extLst>
+            </p:cNvPr>
+            <p:cNvSpPr txBox="1"/>
+            <p:nvPr/>
+          </p:nvSpPr>
+          <p:spPr>
+            <a:xfrm>
+              <a:off x="1779533" y="1965740"/>
+              <a:ext cx="2301904" cy="307777"/>
+            </a:xfrm>
+            <a:prstGeom prst="rect">
+              <a:avLst/>
+            </a:prstGeom>
+            <a:noFill/>
+          </p:spPr>
+          <p:txBody>
+            <a:bodyPr wrap="square" rtlCol="0">
+              <a:spAutoFit/>
+            </a:bodyPr>
+            <a:lstStyle/>
+            <a:p>
+              <a:pPr algn="ctr"/>
+              <a:r>
+                <a:rPr lang="en-US" sz="1400" dirty="0"/>
+                <a:t>AWS Cloud9</a:t>
+              </a:r>
+            </a:p>
+          </p:txBody>
+        </p:sp>
+        <p:pic>
+          <p:nvPicPr>
+            <p:cNvPr id="73" name="Graphic 72">
+              <a:extLst>
+                <a:ext uri="{FF2B5EF4-FFF2-40B4-BE49-F238E27FC236}">
+                  <a16:creationId xmlns:a16="http://schemas.microsoft.com/office/drawing/2014/main" id="{5B95977A-0DAD-BF4C-B1C6-6840D81E096F}"/>
+                </a:ext>
+              </a:extLst>
+            </p:cNvPr>
+            <p:cNvPicPr>
+              <a:picLocks noChangeAspect="1"/>
+            </p:cNvPicPr>
+            <p:nvPr/>
+          </p:nvPicPr>
+          <p:blipFill>
+            <a:blip r:embed="rId24">
+              <a:extLst>
+                <a:ext uri="{96DAC541-7B7A-43D3-8B79-37D633B846F1}">
+                  <asvg:svgBlip xmlns:asvg="http://schemas.microsoft.com/office/drawing/2016/SVG/main" r:embed="rId25"/>
+                </a:ext>
+              </a:extLst>
+            </a:blip>
+            <a:stretch>
+              <a:fillRect/>
+            </a:stretch>
+          </p:blipFill>
+          <p:spPr>
+            <a:xfrm>
+              <a:off x="2574885" y="1208977"/>
+              <a:ext cx="711200" cy="711200"/>
+            </a:xfrm>
+            <a:prstGeom prst="rect">
+              <a:avLst/>
+            </a:prstGeom>
+          </p:spPr>
+        </p:pic>
+      </p:grpSp>
+      <p:cxnSp>
+        <p:nvCxnSpPr>
+          <p:cNvPr id="75" name="Straight Arrow Connector 74">
+            <a:extLst>
+              <a:ext uri="{FF2B5EF4-FFF2-40B4-BE49-F238E27FC236}">
+                <a16:creationId xmlns:a16="http://schemas.microsoft.com/office/drawing/2014/main" id="{9F6DDBFE-167D-F34C-BA71-6F314C1E3C11}"/>
+              </a:ext>
+            </a:extLst>
+          </p:cNvPr>
+          <p:cNvCxnSpPr>
+            <a:cxnSpLocks/>
+          </p:cNvCxnSpPr>
+          <p:nvPr/>
+        </p:nvCxnSpPr>
+        <p:spPr>
+          <a:xfrm>
+            <a:off x="6216404" y="2537382"/>
+            <a:ext cx="1008761" cy="0"/>
+          </a:xfrm>
+          <a:prstGeom prst="straightConnector1">
+            <a:avLst/>
+          </a:prstGeom>
+          <a:ln w="12700">
+            <a:solidFill>
+              <a:srgbClr val="545B64"/>
+            </a:solidFill>
+            <a:headEnd type="arrow" w="med" len="sm"/>
+            <a:tailEnd type="arrow" w="med" len="sm"/>
+          </a:ln>
+        </p:spPr>
+        <p:style>
+          <a:lnRef idx="1">
+            <a:schemeClr val="accent1"/>
+          </a:lnRef>
+          <a:fillRef idx="0">
+            <a:schemeClr val="accent1"/>
+          </a:fillRef>
+          <a:effectRef idx="0">
+            <a:schemeClr val="accent1"/>
+          </a:effectRef>
+          <a:fontRef idx="minor">
+            <a:schemeClr val="tx1"/>
+          </a:fontRef>
+        </p:style>
+      </p:cxnSp>
+      <p:sp>
+        <p:nvSpPr>
+          <p:cNvPr id="76" name="Freeform 75">
+            <a:extLst>
+              <a:ext uri="{FF2B5EF4-FFF2-40B4-BE49-F238E27FC236}">
+                <a16:creationId xmlns:a16="http://schemas.microsoft.com/office/drawing/2014/main" id="{ECD68CB9-6591-8248-A767-8B1BE26CD3D4}"/>
+              </a:ext>
+            </a:extLst>
+          </p:cNvPr>
+          <p:cNvSpPr/>
+          <p:nvPr/>
+        </p:nvSpPr>
+        <p:spPr>
+          <a:xfrm rot="10800000">
+            <a:off x="3949480" y="1766021"/>
+            <a:ext cx="1362623" cy="771361"/>
+          </a:xfrm>
+          <a:custGeom>
+            <a:avLst/>
+            <a:gdLst>
+              <a:gd name="connsiteX0" fmla="*/ 1371600 w 1371600"/>
+              <a:gd name="connsiteY0" fmla="*/ 711200 h 711200"/>
+              <a:gd name="connsiteX1" fmla="*/ 1371600 w 1371600"/>
+              <a:gd name="connsiteY1" fmla="*/ 0 h 711200"/>
+              <a:gd name="connsiteX2" fmla="*/ 0 w 1371600"/>
+              <a:gd name="connsiteY2" fmla="*/ 0 h 711200"/>
+            </a:gdLst>
+            <a:ahLst/>
+            <a:cxnLst>
+              <a:cxn ang="0">
+                <a:pos x="connsiteX0" y="connsiteY0"/>
+              </a:cxn>
+              <a:cxn ang="0">
+                <a:pos x="connsiteX1" y="connsiteY1"/>
+              </a:cxn>
+              <a:cxn ang="0">
+                <a:pos x="connsiteX2" y="connsiteY2"/>
+              </a:cxn>
+            </a:cxnLst>
+            <a:rect l="l" t="t" r="r" b="b"/>
+            <a:pathLst>
+              <a:path w="1371600" h="711200">
+                <a:moveTo>
+                  <a:pt x="1371600" y="711200"/>
+                </a:moveTo>
+                <a:lnTo>
+                  <a:pt x="1371600" y="0"/>
+                </a:lnTo>
+                <a:lnTo>
+                  <a:pt x="0" y="0"/>
+                </a:lnTo>
+              </a:path>
+            </a:pathLst>
+          </a:custGeom>
+          <a:noFill/>
+          <a:ln w="12700">
+            <a:solidFill>
+              <a:schemeClr val="tx2"/>
+            </a:solidFill>
+            <a:headEnd type="arrow" w="med" len="med"/>
+            <a:tailEnd type="arrow" w="med" len="med"/>
+          </a:ln>
+        </p:spPr>
+        <p:style>
+          <a:lnRef idx="2">
+            <a:schemeClr val="accent1">
+              <a:shade val="50000"/>
+            </a:schemeClr>
+          </a:lnRef>
+          <a:fillRef idx="1">
+            <a:schemeClr val="accent1"/>
+          </a:fillRef>
+          <a:effectRef idx="0">
+            <a:schemeClr val="accent1"/>
+          </a:effectRef>
+          <a:fontRef idx="minor">
+            <a:schemeClr val="lt1"/>
+          </a:fontRef>
+        </p:style>
+        <p:txBody>
+          <a:bodyPr rtlCol="0" anchor="ctr"/>
+          <a:lstStyle/>
+          <a:p>
+            <a:pPr algn="ctr"/>
+            <a:endParaRPr lang="en-US"/>
+          </a:p>
+        </p:txBody>
+      </p:sp>
+      <p:cxnSp>
+        <p:nvCxnSpPr>
+          <p:cNvPr id="77" name="Straight Arrow Connector 76">
+            <a:extLst>
+              <a:ext uri="{FF2B5EF4-FFF2-40B4-BE49-F238E27FC236}">
+                <a16:creationId xmlns:a16="http://schemas.microsoft.com/office/drawing/2014/main" id="{C358D999-1A2A-0947-97C8-25A88C0FF7BA}"/>
+              </a:ext>
+            </a:extLst>
+          </p:cNvPr>
+          <p:cNvCxnSpPr>
+            <a:cxnSpLocks/>
+          </p:cNvCxnSpPr>
+          <p:nvPr/>
+        </p:nvCxnSpPr>
+        <p:spPr>
+          <a:xfrm>
+            <a:off x="8078524" y="2524157"/>
+            <a:ext cx="1008761" cy="0"/>
+          </a:xfrm>
+          <a:prstGeom prst="straightConnector1">
+            <a:avLst/>
+          </a:prstGeom>
+          <a:ln w="12700">
+            <a:solidFill>
+              <a:srgbClr val="545B64"/>
+            </a:solidFill>
+            <a:headEnd type="arrow" w="med" len="sm"/>
+            <a:tailEnd type="arrow" w="med" len="sm"/>
+          </a:ln>
+        </p:spPr>
+        <p:style>
+          <a:lnRef idx="1">
+            <a:schemeClr val="accent1"/>
+          </a:lnRef>
+          <a:fillRef idx="0">
+            <a:schemeClr val="accent1"/>
+          </a:fillRef>
+          <a:effectRef idx="0">
+            <a:schemeClr val="accent1"/>
+          </a:effectRef>
+          <a:fontRef idx="minor">
+            <a:schemeClr val="tx1"/>
+          </a:fontRef>
+        </p:style>
+      </p:cxnSp>
+      <p:grpSp>
+        <p:nvGrpSpPr>
+          <p:cNvPr id="15" name="Group 14">
+            <a:extLst>
+              <a:ext uri="{FF2B5EF4-FFF2-40B4-BE49-F238E27FC236}">
+                <a16:creationId xmlns:a16="http://schemas.microsoft.com/office/drawing/2014/main" id="{EC1779CB-423D-B346-B3E5-0450422D6190}"/>
+              </a:ext>
+            </a:extLst>
+          </p:cNvPr>
+          <p:cNvGrpSpPr/>
+          <p:nvPr/>
+        </p:nvGrpSpPr>
+        <p:grpSpPr>
+          <a:xfrm>
+            <a:off x="4659853" y="5113646"/>
+            <a:ext cx="731520" cy="1077856"/>
+            <a:chOff x="5256140" y="5483078"/>
+            <a:chExt cx="731520" cy="1077856"/>
+          </a:xfrm>
+        </p:grpSpPr>
+        <p:pic>
+          <p:nvPicPr>
+            <p:cNvPr id="78" name="Graphic 77">
+              <a:extLst>
+                <a:ext uri="{FF2B5EF4-FFF2-40B4-BE49-F238E27FC236}">
+                  <a16:creationId xmlns:a16="http://schemas.microsoft.com/office/drawing/2014/main" id="{92B03A82-0DBC-8E40-AE52-94BAD10676E5}"/>
+                </a:ext>
+              </a:extLst>
+            </p:cNvPr>
+            <p:cNvPicPr>
+              <a:picLocks noChangeAspect="1"/>
+            </p:cNvPicPr>
+            <p:nvPr/>
+          </p:nvPicPr>
+          <p:blipFill>
+            <a:blip r:embed="rId26">
+              <a:extLst>
+                <a:ext uri="{96DAC541-7B7A-43D3-8B79-37D633B846F1}">
+                  <asvg:svgBlip xmlns:asvg="http://schemas.microsoft.com/office/drawing/2016/SVG/main" r:embed="rId27"/>
+                </a:ext>
+              </a:extLst>
+            </a:blip>
+            <a:stretch>
+              <a:fillRect/>
+            </a:stretch>
+          </p:blipFill>
+          <p:spPr>
+            <a:xfrm>
+              <a:off x="5370333" y="5483078"/>
+              <a:ext cx="469900" cy="469900"/>
+            </a:xfrm>
+            <a:prstGeom prst="rect">
+              <a:avLst/>
+            </a:prstGeom>
+          </p:spPr>
+        </p:pic>
+        <p:sp>
+          <p:nvSpPr>
+            <p:cNvPr id="80" name="TextBox 79">
+              <a:extLst>
+                <a:ext uri="{FF2B5EF4-FFF2-40B4-BE49-F238E27FC236}">
+                  <a16:creationId xmlns:a16="http://schemas.microsoft.com/office/drawing/2014/main" id="{B46C2DA5-75A8-E24B-B489-9C0CBC1EF6B0}"/>
+                </a:ext>
+              </a:extLst>
+            </p:cNvPr>
+            <p:cNvSpPr txBox="1"/>
+            <p:nvPr/>
+          </p:nvSpPr>
+          <p:spPr>
+            <a:xfrm>
+              <a:off x="5256140" y="6012294"/>
+              <a:ext cx="731520" cy="548640"/>
+            </a:xfrm>
+            <a:prstGeom prst="rect">
+              <a:avLst/>
+            </a:prstGeom>
+            <a:noFill/>
+          </p:spPr>
+          <p:txBody>
+            <a:bodyPr wrap="square" lIns="0" tIns="0" rIns="0" bIns="0" rtlCol="0" anchor="t">
+              <a:noAutofit/>
+            </a:bodyPr>
+            <a:lstStyle/>
+            <a:p>
+              <a:pPr algn="ctr"/>
+              <a:r>
+                <a:rPr lang="en-US" sz="1200" dirty="0"/>
+                <a:t>dispenser</a:t>
+              </a:r>
+              <a:endParaRPr lang="en-US" sz="2800" dirty="0"/>
+            </a:p>
+          </p:txBody>
+        </p:sp>
+      </p:grpSp>
+      <p:grpSp>
+        <p:nvGrpSpPr>
+          <p:cNvPr id="14" name="Group 13">
+            <a:extLst>
+              <a:ext uri="{FF2B5EF4-FFF2-40B4-BE49-F238E27FC236}">
+                <a16:creationId xmlns:a16="http://schemas.microsoft.com/office/drawing/2014/main" id="{28B967A6-F6CA-DD43-8ABB-0387A09DAC44}"/>
+              </a:ext>
+            </a:extLst>
+          </p:cNvPr>
+          <p:cNvGrpSpPr/>
+          <p:nvPr/>
+        </p:nvGrpSpPr>
+        <p:grpSpPr>
+          <a:xfrm>
+            <a:off x="5166098" y="5409333"/>
+            <a:ext cx="941482" cy="1110800"/>
+            <a:chOff x="6675169" y="5417624"/>
+            <a:chExt cx="941482" cy="1110800"/>
+          </a:xfrm>
+        </p:grpSpPr>
+        <p:pic>
+          <p:nvPicPr>
+            <p:cNvPr id="81" name="Graphic 80">
+              <a:extLst>
+                <a:ext uri="{FF2B5EF4-FFF2-40B4-BE49-F238E27FC236}">
+                  <a16:creationId xmlns:a16="http://schemas.microsoft.com/office/drawing/2014/main" id="{F149D963-8E17-AD42-91EC-FE59198F6D06}"/>
+                </a:ext>
+              </a:extLst>
+            </p:cNvPr>
+            <p:cNvPicPr>
+              <a:picLocks noChangeAspect="1"/>
+            </p:cNvPicPr>
+            <p:nvPr/>
+          </p:nvPicPr>
+          <p:blipFill>
+            <a:blip r:embed="rId28">
+              <a:extLst>
+                <a:ext uri="{96DAC541-7B7A-43D3-8B79-37D633B846F1}">
+                  <asvg:svgBlip xmlns:asvg="http://schemas.microsoft.com/office/drawing/2016/SVG/main" r:embed="rId29"/>
+                </a:ext>
+              </a:extLst>
+            </a:blip>
+            <a:stretch>
+              <a:fillRect/>
+            </a:stretch>
+          </p:blipFill>
+          <p:spPr>
+            <a:xfrm>
+              <a:off x="6910960" y="5417624"/>
+              <a:ext cx="469900" cy="469900"/>
+            </a:xfrm>
+            <a:prstGeom prst="rect">
+              <a:avLst/>
+            </a:prstGeom>
+          </p:spPr>
+        </p:pic>
+        <p:sp>
+          <p:nvSpPr>
+            <p:cNvPr id="82" name="TextBox 81">
+              <a:extLst>
+                <a:ext uri="{FF2B5EF4-FFF2-40B4-BE49-F238E27FC236}">
+                  <a16:creationId xmlns:a16="http://schemas.microsoft.com/office/drawing/2014/main" id="{82F2CDC9-E0F5-6F48-8B7E-3B7016216D61}"/>
+                </a:ext>
+              </a:extLst>
+            </p:cNvPr>
+            <p:cNvSpPr txBox="1"/>
+            <p:nvPr/>
+          </p:nvSpPr>
+          <p:spPr>
+            <a:xfrm>
+              <a:off x="6675169" y="5979784"/>
+              <a:ext cx="941482" cy="548640"/>
+            </a:xfrm>
+            <a:prstGeom prst="rect">
+              <a:avLst/>
+            </a:prstGeom>
+            <a:noFill/>
+          </p:spPr>
+          <p:txBody>
+            <a:bodyPr wrap="square" lIns="0" tIns="0" rIns="0" bIns="0" rtlCol="0" anchor="t">
+              <a:noAutofit/>
+            </a:bodyPr>
+            <a:lstStyle/>
+            <a:p>
+              <a:pPr algn="ctr"/>
+              <a:r>
+                <a:rPr lang="en-US" sz="1200" dirty="0" err="1"/>
+                <a:t>IoT</a:t>
+              </a:r>
+              <a:r>
+                <a:rPr lang="en-US" sz="1200" dirty="0"/>
+                <a:t> certificate</a:t>
+              </a:r>
+              <a:endParaRPr lang="en-US" sz="2800" dirty="0"/>
+            </a:p>
+          </p:txBody>
+        </p:sp>
+      </p:grpSp>
+      <p:grpSp>
+        <p:nvGrpSpPr>
+          <p:cNvPr id="19" name="Group 18">
+            <a:extLst>
+              <a:ext uri="{FF2B5EF4-FFF2-40B4-BE49-F238E27FC236}">
+                <a16:creationId xmlns:a16="http://schemas.microsoft.com/office/drawing/2014/main" id="{AE8F26E3-8878-A74D-9BED-1E56E014038B}"/>
+              </a:ext>
+            </a:extLst>
+          </p:cNvPr>
+          <p:cNvGrpSpPr/>
+          <p:nvPr/>
+        </p:nvGrpSpPr>
+        <p:grpSpPr>
+          <a:xfrm>
+            <a:off x="7088185" y="5342534"/>
+            <a:ext cx="2301904" cy="802281"/>
+            <a:chOff x="7105050" y="5113646"/>
+            <a:chExt cx="2301904" cy="802281"/>
+          </a:xfrm>
+        </p:grpSpPr>
+        <p:pic>
+          <p:nvPicPr>
+            <p:cNvPr id="83" name="Picture 82">
+              <a:extLst>
+                <a:ext uri="{FF2B5EF4-FFF2-40B4-BE49-F238E27FC236}">
+                  <a16:creationId xmlns:a16="http://schemas.microsoft.com/office/drawing/2014/main" id="{6F4A1A0E-1C6C-2F4E-BB20-9AEA0D129674}"/>
+                </a:ext>
+              </a:extLst>
+            </p:cNvPr>
+            <p:cNvPicPr>
+              <a:picLocks noChangeAspect="1"/>
+            </p:cNvPicPr>
+            <p:nvPr/>
+          </p:nvPicPr>
+          <p:blipFill>
+            <a:blip r:embed="rId30"/>
+            <a:stretch>
+              <a:fillRect/>
+            </a:stretch>
+          </p:blipFill>
+          <p:spPr>
+            <a:xfrm>
+              <a:off x="7947905" y="5113646"/>
+              <a:ext cx="635000" cy="635000"/>
+            </a:xfrm>
+            <a:prstGeom prst="rect">
+              <a:avLst/>
+            </a:prstGeom>
+          </p:spPr>
+        </p:pic>
+        <p:sp>
+          <p:nvSpPr>
+            <p:cNvPr id="84" name="TextBox 83">
+              <a:extLst>
+                <a:ext uri="{FF2B5EF4-FFF2-40B4-BE49-F238E27FC236}">
+                  <a16:creationId xmlns:a16="http://schemas.microsoft.com/office/drawing/2014/main" id="{DE015632-8D04-EE41-B6D5-8B811CDFF156}"/>
+                </a:ext>
+              </a:extLst>
+            </p:cNvPr>
+            <p:cNvSpPr txBox="1"/>
+            <p:nvPr/>
+          </p:nvSpPr>
+          <p:spPr>
+            <a:xfrm>
+              <a:off x="7105050" y="5638928"/>
+              <a:ext cx="2301904" cy="276999"/>
+            </a:xfrm>
+            <a:prstGeom prst="rect">
+              <a:avLst/>
+            </a:prstGeom>
+            <a:noFill/>
+          </p:spPr>
+          <p:txBody>
+            <a:bodyPr wrap="square" rtlCol="0">
+              <a:spAutoFit/>
+            </a:bodyPr>
+            <a:lstStyle/>
+            <a:p>
+              <a:pPr algn="ctr"/>
+              <a:r>
+                <a:rPr lang="en-US" sz="1200" dirty="0"/>
+                <a:t>Instance</a:t>
+              </a:r>
+            </a:p>
+          </p:txBody>
+        </p:sp>
+      </p:grpSp>
+      <p:grpSp>
+        <p:nvGrpSpPr>
+          <p:cNvPr id="85" name="Group 84">
+            <a:extLst>
+              <a:ext uri="{FF2B5EF4-FFF2-40B4-BE49-F238E27FC236}">
+                <a16:creationId xmlns:a16="http://schemas.microsoft.com/office/drawing/2014/main" id="{491965BA-9016-FC44-95A5-8C95473CA28B}"/>
+              </a:ext>
+            </a:extLst>
+          </p:cNvPr>
+          <p:cNvGrpSpPr/>
+          <p:nvPr/>
+        </p:nvGrpSpPr>
+        <p:grpSpPr>
+          <a:xfrm>
+            <a:off x="6371978" y="5512652"/>
+            <a:ext cx="780956" cy="816500"/>
+            <a:chOff x="1032608" y="4750101"/>
+            <a:chExt cx="1072750" cy="1121576"/>
+          </a:xfrm>
+        </p:grpSpPr>
+        <p:pic>
+          <p:nvPicPr>
+            <p:cNvPr id="86" name="Graphic 85">
+              <a:extLst>
+                <a:ext uri="{FF2B5EF4-FFF2-40B4-BE49-F238E27FC236}">
+                  <a16:creationId xmlns:a16="http://schemas.microsoft.com/office/drawing/2014/main" id="{F0978C57-6C8B-0D40-A0BE-698E0F8D6591}"/>
+                </a:ext>
+              </a:extLst>
+            </p:cNvPr>
+            <p:cNvPicPr>
+              <a:picLocks noChangeAspect="1"/>
+            </p:cNvPicPr>
+            <p:nvPr/>
+          </p:nvPicPr>
+          <p:blipFill>
+            <a:blip r:embed="rId2">
+              <a:extLst>
+                <a:ext uri="{96DAC541-7B7A-43D3-8B79-37D633B846F1}">
+                  <asvg:svgBlip xmlns:asvg="http://schemas.microsoft.com/office/drawing/2016/SVG/main" r:embed="rId3"/>
+                </a:ext>
+              </a:extLst>
+            </a:blip>
+            <a:stretch>
+              <a:fillRect/>
+            </a:stretch>
+          </p:blipFill>
+          <p:spPr>
+            <a:xfrm>
+              <a:off x="1334033" y="4750101"/>
+              <a:ext cx="469900" cy="469900"/>
+            </a:xfrm>
+            <a:prstGeom prst="rect">
+              <a:avLst/>
+            </a:prstGeom>
+          </p:spPr>
+        </p:pic>
+        <p:sp>
+          <p:nvSpPr>
+            <p:cNvPr id="87" name="TextBox 86">
+              <a:extLst>
+                <a:ext uri="{FF2B5EF4-FFF2-40B4-BE49-F238E27FC236}">
+                  <a16:creationId xmlns:a16="http://schemas.microsoft.com/office/drawing/2014/main" id="{D1EF66CE-2683-2540-9D3A-1A8666FEEF3B}"/>
+                </a:ext>
+              </a:extLst>
+            </p:cNvPr>
+            <p:cNvSpPr txBox="1"/>
+            <p:nvPr/>
+          </p:nvSpPr>
+          <p:spPr>
+            <a:xfrm>
+              <a:off x="1032608" y="5322070"/>
+              <a:ext cx="1072750" cy="549607"/>
+            </a:xfrm>
+            <a:prstGeom prst="rect">
+              <a:avLst/>
+            </a:prstGeom>
+            <a:noFill/>
+          </p:spPr>
+          <p:txBody>
+            <a:bodyPr wrap="square" rtlCol="0">
+              <a:spAutoFit/>
+            </a:bodyPr>
+            <a:lstStyle/>
+            <a:p>
+              <a:pPr algn="ctr"/>
+              <a:r>
+                <a:rPr lang="en-US" sz="1000" dirty="0"/>
+                <a:t>User Account</a:t>
+              </a:r>
+            </a:p>
+          </p:txBody>
+        </p:sp>
+      </p:grpSp>
+      <p:cxnSp>
+        <p:nvCxnSpPr>
+          <p:cNvPr id="88" name="Straight Arrow Connector 87">
+            <a:extLst>
+              <a:ext uri="{FF2B5EF4-FFF2-40B4-BE49-F238E27FC236}">
+                <a16:creationId xmlns:a16="http://schemas.microsoft.com/office/drawing/2014/main" id="{E8FFC69D-622A-2B44-B5C1-F6DFF432CF89}"/>
+              </a:ext>
+            </a:extLst>
+          </p:cNvPr>
+          <p:cNvCxnSpPr>
+            <a:cxnSpLocks/>
+          </p:cNvCxnSpPr>
+          <p:nvPr/>
+        </p:nvCxnSpPr>
+        <p:spPr>
+          <a:xfrm>
+            <a:off x="5228315" y="3625388"/>
+            <a:ext cx="2998990" cy="0"/>
+          </a:xfrm>
+          <a:prstGeom prst="straightConnector1">
+            <a:avLst/>
+          </a:prstGeom>
+          <a:ln w="12700">
+            <a:solidFill>
+              <a:srgbClr val="545B64"/>
+            </a:solidFill>
+            <a:headEnd type="none" w="med" len="sm"/>
+            <a:tailEnd type="none" w="med" len="sm"/>
+          </a:ln>
+        </p:spPr>
+        <p:style>
+          <a:lnRef idx="1">
+            <a:schemeClr val="accent1"/>
+          </a:lnRef>
+          <a:fillRef idx="0">
+            <a:schemeClr val="accent1"/>
+          </a:fillRef>
+          <a:effectRef idx="0">
+            <a:schemeClr val="accent1"/>
+          </a:effectRef>
+          <a:fontRef idx="minor">
+            <a:schemeClr val="tx1"/>
+          </a:fontRef>
+        </p:style>
+      </p:cxnSp>
+      <p:cxnSp>
+        <p:nvCxnSpPr>
+          <p:cNvPr id="89" name="Straight Arrow Connector 88">
+            <a:extLst>
+              <a:ext uri="{FF2B5EF4-FFF2-40B4-BE49-F238E27FC236}">
+                <a16:creationId xmlns:a16="http://schemas.microsoft.com/office/drawing/2014/main" id="{90E17799-564E-DF41-966D-B159810CD437}"/>
+              </a:ext>
+            </a:extLst>
+          </p:cNvPr>
+          <p:cNvCxnSpPr>
+            <a:cxnSpLocks/>
+            <a:endCxn id="116" idx="0"/>
+          </p:cNvCxnSpPr>
+          <p:nvPr/>
+        </p:nvCxnSpPr>
+        <p:spPr>
+          <a:xfrm>
+            <a:off x="5228315" y="3625388"/>
+            <a:ext cx="0" cy="245259"/>
+          </a:xfrm>
+          <a:prstGeom prst="straightConnector1">
+            <a:avLst/>
+          </a:prstGeom>
+          <a:ln w="12700">
+            <a:solidFill>
+              <a:srgbClr val="545B64"/>
+            </a:solidFill>
+            <a:headEnd type="none" w="med" len="sm"/>
+            <a:tailEnd type="arrow" w="med" len="sm"/>
+          </a:ln>
+        </p:spPr>
+        <p:style>
+          <a:lnRef idx="1">
+            <a:schemeClr val="accent1"/>
+          </a:lnRef>
+          <a:fillRef idx="0">
+            <a:schemeClr val="accent1"/>
+          </a:fillRef>
+          <a:effectRef idx="0">
+            <a:schemeClr val="accent1"/>
+          </a:effectRef>
+          <a:fontRef idx="minor">
+            <a:schemeClr val="tx1"/>
+          </a:fontRef>
+        </p:style>
+      </p:cxnSp>
+      <p:cxnSp>
+        <p:nvCxnSpPr>
+          <p:cNvPr id="90" name="Straight Arrow Connector 89">
+            <a:extLst>
+              <a:ext uri="{FF2B5EF4-FFF2-40B4-BE49-F238E27FC236}">
+                <a16:creationId xmlns:a16="http://schemas.microsoft.com/office/drawing/2014/main" id="{4D3D1F50-A679-8F42-8333-20923409F06C}"/>
+              </a:ext>
+            </a:extLst>
+          </p:cNvPr>
+          <p:cNvCxnSpPr>
+            <a:cxnSpLocks/>
+          </p:cNvCxnSpPr>
+          <p:nvPr/>
+        </p:nvCxnSpPr>
+        <p:spPr>
+          <a:xfrm>
+            <a:off x="6756235" y="3625388"/>
+            <a:ext cx="0" cy="245259"/>
+          </a:xfrm>
+          <a:prstGeom prst="straightConnector1">
+            <a:avLst/>
+          </a:prstGeom>
+          <a:ln w="12700">
+            <a:solidFill>
+              <a:srgbClr val="545B64"/>
+            </a:solidFill>
+            <a:headEnd type="none" w="med" len="sm"/>
+            <a:tailEnd type="arrow" w="med" len="sm"/>
+          </a:ln>
+        </p:spPr>
+        <p:style>
+          <a:lnRef idx="1">
+            <a:schemeClr val="accent1"/>
+          </a:lnRef>
+          <a:fillRef idx="0">
+            <a:schemeClr val="accent1"/>
+          </a:fillRef>
+          <a:effectRef idx="0">
+            <a:schemeClr val="accent1"/>
+          </a:effectRef>
+          <a:fontRef idx="minor">
+            <a:schemeClr val="tx1"/>
+          </a:fontRef>
+        </p:style>
+      </p:cxnSp>
+      <p:cxnSp>
+        <p:nvCxnSpPr>
+          <p:cNvPr id="91" name="Straight Arrow Connector 90">
+            <a:extLst>
+              <a:ext uri="{FF2B5EF4-FFF2-40B4-BE49-F238E27FC236}">
+                <a16:creationId xmlns:a16="http://schemas.microsoft.com/office/drawing/2014/main" id="{710C4ED4-CDB3-DA48-9963-655EE6E487D0}"/>
+              </a:ext>
+            </a:extLst>
+          </p:cNvPr>
+          <p:cNvCxnSpPr>
+            <a:cxnSpLocks/>
+          </p:cNvCxnSpPr>
+          <p:nvPr/>
+        </p:nvCxnSpPr>
+        <p:spPr>
+          <a:xfrm>
+            <a:off x="8227305" y="3625388"/>
+            <a:ext cx="0" cy="245259"/>
+          </a:xfrm>
+          <a:prstGeom prst="straightConnector1">
+            <a:avLst/>
+          </a:prstGeom>
+          <a:ln w="12700">
+            <a:solidFill>
+              <a:srgbClr val="545B64"/>
+            </a:solidFill>
+            <a:headEnd type="none" w="med" len="sm"/>
+            <a:tailEnd type="arrow" w="med" len="sm"/>
+          </a:ln>
+        </p:spPr>
+        <p:style>
+          <a:lnRef idx="1">
+            <a:schemeClr val="accent1"/>
+          </a:lnRef>
+          <a:fillRef idx="0">
+            <a:schemeClr val="accent1"/>
+          </a:fillRef>
+          <a:effectRef idx="0">
+            <a:schemeClr val="accent1"/>
+          </a:effectRef>
+          <a:fontRef idx="minor">
+            <a:schemeClr val="tx1"/>
+          </a:fontRef>
+        </p:style>
+      </p:cxnSp>
+      <p:cxnSp>
+        <p:nvCxnSpPr>
+          <p:cNvPr id="92" name="Straight Arrow Connector 91">
+            <a:extLst>
+              <a:ext uri="{FF2B5EF4-FFF2-40B4-BE49-F238E27FC236}">
+                <a16:creationId xmlns:a16="http://schemas.microsoft.com/office/drawing/2014/main" id="{85802715-3F88-0940-9373-8BB9B32B31D2}"/>
+              </a:ext>
+            </a:extLst>
+          </p:cNvPr>
+          <p:cNvCxnSpPr>
+            <a:cxnSpLocks/>
+            <a:stCxn id="115" idx="2"/>
+            <a:endCxn id="78" idx="0"/>
+          </p:cNvCxnSpPr>
+          <p:nvPr/>
+        </p:nvCxnSpPr>
+        <p:spPr>
+          <a:xfrm flipH="1">
+            <a:off x="5008996" y="4866251"/>
+            <a:ext cx="219319" cy="247395"/>
+          </a:xfrm>
+          <a:prstGeom prst="straightConnector1">
+            <a:avLst/>
+          </a:prstGeom>
+          <a:ln w="12700">
+            <a:solidFill>
+              <a:srgbClr val="545B64"/>
+            </a:solidFill>
+            <a:headEnd type="none" w="med" len="med"/>
+            <a:tailEnd type="arrow" w="med" len="med"/>
+          </a:ln>
+        </p:spPr>
+        <p:style>
+          <a:lnRef idx="1">
+            <a:schemeClr val="accent1"/>
+          </a:lnRef>
+          <a:fillRef idx="0">
+            <a:schemeClr val="accent1"/>
+          </a:fillRef>
+          <a:effectRef idx="0">
+            <a:schemeClr val="accent1"/>
+          </a:effectRef>
+          <a:fontRef idx="minor">
+            <a:schemeClr val="tx1"/>
+          </a:fontRef>
+        </p:style>
+      </p:cxnSp>
+      <p:cxnSp>
+        <p:nvCxnSpPr>
+          <p:cNvPr id="93" name="Straight Arrow Connector 92">
+            <a:extLst>
+              <a:ext uri="{FF2B5EF4-FFF2-40B4-BE49-F238E27FC236}">
+                <a16:creationId xmlns:a16="http://schemas.microsoft.com/office/drawing/2014/main" id="{EE8E2E99-C805-9447-BCF3-17021DB83124}"/>
+              </a:ext>
+            </a:extLst>
+          </p:cNvPr>
+          <p:cNvCxnSpPr>
+            <a:cxnSpLocks/>
+            <a:endCxn id="55" idx="2"/>
+          </p:cNvCxnSpPr>
+          <p:nvPr/>
+        </p:nvCxnSpPr>
+        <p:spPr>
+          <a:xfrm flipV="1">
+            <a:off x="7644820" y="3153436"/>
+            <a:ext cx="0" cy="471952"/>
+          </a:xfrm>
+          <a:prstGeom prst="straightConnector1">
+            <a:avLst/>
+          </a:prstGeom>
+          <a:ln w="12700">
+            <a:solidFill>
+              <a:srgbClr val="545B64"/>
+            </a:solidFill>
+            <a:headEnd type="none" w="med" len="sm"/>
+            <a:tailEnd type="arrow" w="med" len="sm"/>
+          </a:ln>
+        </p:spPr>
+        <p:style>
+          <a:lnRef idx="1">
+            <a:schemeClr val="accent1"/>
+          </a:lnRef>
+          <a:fillRef idx="0">
+            <a:schemeClr val="accent1"/>
+          </a:fillRef>
+          <a:effectRef idx="0">
+            <a:schemeClr val="accent1"/>
+          </a:effectRef>
+          <a:fontRef idx="minor">
+            <a:schemeClr val="tx1"/>
+          </a:fontRef>
+        </p:style>
+      </p:cxnSp>
+      <p:cxnSp>
+        <p:nvCxnSpPr>
+          <p:cNvPr id="101" name="Straight Arrow Connector 100">
+            <a:extLst>
+              <a:ext uri="{FF2B5EF4-FFF2-40B4-BE49-F238E27FC236}">
+                <a16:creationId xmlns:a16="http://schemas.microsoft.com/office/drawing/2014/main" id="{AFEDD59C-03E8-A645-BBE3-FC276C30AA8D}"/>
+              </a:ext>
+            </a:extLst>
+          </p:cNvPr>
+          <p:cNvCxnSpPr>
+            <a:cxnSpLocks/>
+            <a:stCxn id="115" idx="2"/>
+            <a:endCxn id="81" idx="0"/>
+          </p:cNvCxnSpPr>
+          <p:nvPr/>
+        </p:nvCxnSpPr>
+        <p:spPr>
+          <a:xfrm>
+            <a:off x="5228315" y="4866251"/>
+            <a:ext cx="408524" cy="543082"/>
+          </a:xfrm>
+          <a:prstGeom prst="straightConnector1">
+            <a:avLst/>
+          </a:prstGeom>
+          <a:ln w="12700">
+            <a:solidFill>
+              <a:srgbClr val="545B64"/>
+            </a:solidFill>
+            <a:headEnd type="none" w="med" len="med"/>
+            <a:tailEnd type="arrow" w="med" len="med"/>
+          </a:ln>
+        </p:spPr>
+        <p:style>
+          <a:lnRef idx="1">
+            <a:schemeClr val="accent1"/>
+          </a:lnRef>
+          <a:fillRef idx="0">
+            <a:schemeClr val="accent1"/>
+          </a:fillRef>
+          <a:effectRef idx="0">
+            <a:schemeClr val="accent1"/>
+          </a:effectRef>
+          <a:fontRef idx="minor">
+            <a:schemeClr val="tx1"/>
+          </a:fontRef>
+        </p:style>
+      </p:cxnSp>
+      <p:cxnSp>
+        <p:nvCxnSpPr>
+          <p:cNvPr id="104" name="Straight Arrow Connector 103">
+            <a:extLst>
+              <a:ext uri="{FF2B5EF4-FFF2-40B4-BE49-F238E27FC236}">
+                <a16:creationId xmlns:a16="http://schemas.microsoft.com/office/drawing/2014/main" id="{1BCA8184-1FC4-F04A-98A5-A2B098804DF3}"/>
+              </a:ext>
+            </a:extLst>
+          </p:cNvPr>
+          <p:cNvCxnSpPr>
+            <a:cxnSpLocks/>
+            <a:stCxn id="59" idx="2"/>
+          </p:cNvCxnSpPr>
+          <p:nvPr/>
+        </p:nvCxnSpPr>
+        <p:spPr>
+          <a:xfrm>
+            <a:off x="6756235" y="5149832"/>
+            <a:ext cx="0" cy="293634"/>
+          </a:xfrm>
+          <a:prstGeom prst="straightConnector1">
+            <a:avLst/>
+          </a:prstGeom>
+          <a:ln w="12700">
+            <a:solidFill>
+              <a:srgbClr val="545B64"/>
+            </a:solidFill>
+            <a:headEnd type="none" w="med" len="med"/>
+            <a:tailEnd type="arrow" w="med" len="med"/>
+          </a:ln>
+        </p:spPr>
+        <p:style>
+          <a:lnRef idx="1">
+            <a:schemeClr val="accent1"/>
+          </a:lnRef>
+          <a:fillRef idx="0">
+            <a:schemeClr val="accent1"/>
+          </a:fillRef>
+          <a:effectRef idx="0">
+            <a:schemeClr val="accent1"/>
+          </a:effectRef>
+          <a:fontRef idx="minor">
+            <a:schemeClr val="tx1"/>
+          </a:fontRef>
+        </p:style>
+      </p:cxnSp>
+      <p:cxnSp>
+        <p:nvCxnSpPr>
+          <p:cNvPr id="107" name="Straight Arrow Connector 106">
+            <a:extLst>
+              <a:ext uri="{FF2B5EF4-FFF2-40B4-BE49-F238E27FC236}">
+                <a16:creationId xmlns:a16="http://schemas.microsoft.com/office/drawing/2014/main" id="{1088B80A-07D3-944E-BC9F-9215482A9F71}"/>
+              </a:ext>
+            </a:extLst>
+          </p:cNvPr>
+          <p:cNvCxnSpPr>
+            <a:cxnSpLocks/>
+          </p:cNvCxnSpPr>
+          <p:nvPr/>
+        </p:nvCxnSpPr>
+        <p:spPr>
+          <a:xfrm flipH="1">
+            <a:off x="8248540" y="4966829"/>
+            <a:ext cx="5558" cy="493638"/>
+          </a:xfrm>
+          <a:prstGeom prst="straightConnector1">
+            <a:avLst/>
+          </a:prstGeom>
+          <a:ln w="12700">
+            <a:solidFill>
+              <a:srgbClr val="545B64"/>
+            </a:solidFill>
+            <a:headEnd type="none" w="med" len="med"/>
+            <a:tailEnd type="arrow" w="med" len="med"/>
+          </a:ln>
+        </p:spPr>
+        <p:style>
+          <a:lnRef idx="1">
+            <a:schemeClr val="accent1"/>
+          </a:lnRef>
+          <a:fillRef idx="0">
+            <a:schemeClr val="accent1"/>
+          </a:fillRef>
+          <a:effectRef idx="0">
+            <a:schemeClr val="accent1"/>
+          </a:effectRef>
+          <a:fontRef idx="minor">
+            <a:schemeClr val="tx1"/>
+          </a:fontRef>
+        </p:style>
+      </p:cxnSp>
+      <p:sp>
+        <p:nvSpPr>
+          <p:cNvPr id="58" name="Oval 57">
+            <a:extLst>
+              <a:ext uri="{FF2B5EF4-FFF2-40B4-BE49-F238E27FC236}">
+                <a16:creationId xmlns:a16="http://schemas.microsoft.com/office/drawing/2014/main" id="{8D8881FD-AFDD-B24F-B221-DF5769E475B3}"/>
+              </a:ext>
+            </a:extLst>
+          </p:cNvPr>
+          <p:cNvSpPr/>
+          <p:nvPr/>
+        </p:nvSpPr>
+        <p:spPr>
+          <a:xfrm>
+            <a:off x="4691680" y="731236"/>
+            <a:ext cx="248851" cy="248851"/>
+          </a:xfrm>
+          <a:prstGeom prst="ellipse">
+            <a:avLst/>
+          </a:prstGeom>
+          <a:solidFill>
+            <a:schemeClr val="accent2"/>
+          </a:solidFill>
+        </p:spPr>
+        <p:style>
+          <a:lnRef idx="2">
+            <a:schemeClr val="accent1">
+              <a:shade val="50000"/>
+            </a:schemeClr>
+          </a:lnRef>
+          <a:fillRef idx="1">
+            <a:schemeClr val="accent1"/>
+          </a:fillRef>
+          <a:effectRef idx="0">
+            <a:schemeClr val="accent1"/>
+          </a:effectRef>
+          <a:fontRef idx="minor">
+            <a:schemeClr val="lt1"/>
+          </a:fontRef>
+        </p:style>
+        <p:txBody>
+          <a:bodyPr rtlCol="0" anchor="ctr"/>
+          <a:lstStyle/>
+          <a:p>
+            <a:pPr algn="ctr"/>
+            <a:r>
+              <a:rPr lang="en-US" dirty="0"/>
+              <a:t>1</a:t>
+            </a:r>
+          </a:p>
+        </p:txBody>
+      </p:sp>
+      <p:cxnSp>
+        <p:nvCxnSpPr>
+          <p:cNvPr id="118" name="Elbow Connector 117">
+            <a:extLst>
+              <a:ext uri="{FF2B5EF4-FFF2-40B4-BE49-F238E27FC236}">
+                <a16:creationId xmlns:a16="http://schemas.microsoft.com/office/drawing/2014/main" id="{7016BC8D-F5C1-3C43-90EE-1DC4A61F0A53}"/>
+              </a:ext>
+            </a:extLst>
+          </p:cNvPr>
+          <p:cNvCxnSpPr>
+            <a:cxnSpLocks/>
+            <a:stCxn id="56" idx="0"/>
+            <a:endCxn id="69" idx="2"/>
+          </p:cNvCxnSpPr>
+          <p:nvPr/>
+        </p:nvCxnSpPr>
+        <p:spPr>
+          <a:xfrm rot="16200000" flipV="1">
+            <a:off x="6444358" y="1088069"/>
+            <a:ext cx="520359" cy="1880566"/>
+          </a:xfrm>
+          <a:prstGeom prst="bentConnector3">
+            <a:avLst>
+              <a:gd name="adj1" fmla="val 50000"/>
+            </a:avLst>
+          </a:prstGeom>
+          <a:ln w="12700">
+            <a:solidFill>
+              <a:schemeClr val="tx2"/>
+            </a:solidFill>
+            <a:headEnd type="none" w="med" len="sm"/>
+            <a:tailEnd type="arrow" w="med" len="sm"/>
+          </a:ln>
+        </p:spPr>
+        <p:style>
+          <a:lnRef idx="1">
+            <a:schemeClr val="accent1"/>
+          </a:lnRef>
+          <a:fillRef idx="0">
+            <a:schemeClr val="accent1"/>
+          </a:fillRef>
+          <a:effectRef idx="0">
+            <a:schemeClr val="accent1"/>
+          </a:effectRef>
+          <a:fontRef idx="minor">
+            <a:schemeClr val="tx1"/>
+          </a:fontRef>
+        </p:style>
+      </p:cxnSp>
+      <p:sp>
+        <p:nvSpPr>
+          <p:cNvPr id="120" name="Oval 119">
+            <a:extLst>
+              <a:ext uri="{FF2B5EF4-FFF2-40B4-BE49-F238E27FC236}">
+                <a16:creationId xmlns:a16="http://schemas.microsoft.com/office/drawing/2014/main" id="{248DC130-B70A-4A45-ADD6-2F615337E01E}"/>
+              </a:ext>
+            </a:extLst>
+          </p:cNvPr>
+          <p:cNvSpPr/>
+          <p:nvPr/>
+        </p:nvSpPr>
+        <p:spPr>
+          <a:xfrm>
+            <a:off x="6942826" y="719963"/>
+            <a:ext cx="248851" cy="248851"/>
+          </a:xfrm>
+          <a:prstGeom prst="ellipse">
+            <a:avLst/>
+          </a:prstGeom>
+          <a:solidFill>
+            <a:schemeClr val="accent2"/>
+          </a:solidFill>
+        </p:spPr>
+        <p:style>
+          <a:lnRef idx="2">
+            <a:schemeClr val="accent1">
+              <a:shade val="50000"/>
+            </a:schemeClr>
+          </a:lnRef>
+          <a:fillRef idx="1">
+            <a:schemeClr val="accent1"/>
+          </a:fillRef>
+          <a:effectRef idx="0">
+            <a:schemeClr val="accent1"/>
+          </a:effectRef>
+          <a:fontRef idx="minor">
+            <a:schemeClr val="lt1"/>
+          </a:fontRef>
+        </p:style>
+        <p:txBody>
+          <a:bodyPr rtlCol="0" anchor="ctr"/>
+          <a:lstStyle/>
+          <a:p>
+            <a:pPr algn="ctr"/>
+            <a:r>
+              <a:rPr lang="en-US" dirty="0"/>
+              <a:t>2</a:t>
+            </a:r>
+          </a:p>
+        </p:txBody>
+      </p:sp>
+      <p:sp>
+        <p:nvSpPr>
+          <p:cNvPr id="122" name="Oval 121">
+            <a:extLst>
+              <a:ext uri="{FF2B5EF4-FFF2-40B4-BE49-F238E27FC236}">
+                <a16:creationId xmlns:a16="http://schemas.microsoft.com/office/drawing/2014/main" id="{CF707094-A0C3-5B49-89AE-AF99444460EA}"/>
+              </a:ext>
+            </a:extLst>
+          </p:cNvPr>
+          <p:cNvSpPr/>
+          <p:nvPr/>
+        </p:nvSpPr>
+        <p:spPr>
+          <a:xfrm>
+            <a:off x="4061892" y="2204554"/>
+            <a:ext cx="248851" cy="248851"/>
+          </a:xfrm>
+          <a:prstGeom prst="ellipse">
+            <a:avLst/>
+          </a:prstGeom>
+          <a:solidFill>
+            <a:schemeClr val="accent2"/>
+          </a:solidFill>
+        </p:spPr>
+        <p:style>
+          <a:lnRef idx="2">
+            <a:schemeClr val="accent1">
+              <a:shade val="50000"/>
+            </a:schemeClr>
+          </a:lnRef>
+          <a:fillRef idx="1">
+            <a:schemeClr val="accent1"/>
+          </a:fillRef>
+          <a:effectRef idx="0">
+            <a:schemeClr val="accent1"/>
+          </a:effectRef>
+          <a:fontRef idx="minor">
+            <a:schemeClr val="lt1"/>
+          </a:fontRef>
+        </p:style>
+        <p:txBody>
+          <a:bodyPr rtlCol="0" anchor="ctr"/>
+          <a:lstStyle/>
+          <a:p>
+            <a:pPr algn="ctr"/>
+            <a:r>
+              <a:rPr lang="en-US" dirty="0"/>
+              <a:t>3</a:t>
+            </a:r>
+          </a:p>
+        </p:txBody>
+      </p:sp>
+      <p:sp>
+        <p:nvSpPr>
+          <p:cNvPr id="123" name="Oval 122">
+            <a:extLst>
+              <a:ext uri="{FF2B5EF4-FFF2-40B4-BE49-F238E27FC236}">
+                <a16:creationId xmlns:a16="http://schemas.microsoft.com/office/drawing/2014/main" id="{6F06E64B-5CA2-8647-9803-20F3BF19648B}"/>
+              </a:ext>
+            </a:extLst>
+          </p:cNvPr>
+          <p:cNvSpPr/>
+          <p:nvPr/>
+        </p:nvSpPr>
+        <p:spPr>
+          <a:xfrm>
+            <a:off x="7243646" y="3141404"/>
+            <a:ext cx="248851" cy="248851"/>
+          </a:xfrm>
+          <a:prstGeom prst="ellipse">
+            <a:avLst/>
+          </a:prstGeom>
+          <a:solidFill>
+            <a:schemeClr val="accent2"/>
+          </a:solidFill>
+        </p:spPr>
+        <p:style>
+          <a:lnRef idx="2">
+            <a:schemeClr val="accent1">
+              <a:shade val="50000"/>
+            </a:schemeClr>
+          </a:lnRef>
+          <a:fillRef idx="1">
+            <a:schemeClr val="accent1"/>
+          </a:fillRef>
+          <a:effectRef idx="0">
+            <a:schemeClr val="accent1"/>
+          </a:effectRef>
+          <a:fontRef idx="minor">
+            <a:schemeClr val="lt1"/>
+          </a:fontRef>
+        </p:style>
+        <p:txBody>
+          <a:bodyPr rtlCol="0" anchor="ctr"/>
+          <a:lstStyle/>
+          <a:p>
+            <a:pPr algn="ctr"/>
+            <a:r>
+              <a:rPr lang="en-US" dirty="0"/>
+              <a:t>4</a:t>
+            </a:r>
+          </a:p>
+        </p:txBody>
+      </p:sp>
+      <p:sp>
+        <p:nvSpPr>
+          <p:cNvPr id="124" name="Oval 123">
+            <a:extLst>
+              <a:ext uri="{FF2B5EF4-FFF2-40B4-BE49-F238E27FC236}">
+                <a16:creationId xmlns:a16="http://schemas.microsoft.com/office/drawing/2014/main" id="{E9B36C4A-73BE-624A-8FA8-3CD538BF745B}"/>
+              </a:ext>
+            </a:extLst>
+          </p:cNvPr>
+          <p:cNvSpPr/>
+          <p:nvPr/>
+        </p:nvSpPr>
+        <p:spPr>
+          <a:xfrm>
+            <a:off x="7299715" y="5504236"/>
+            <a:ext cx="248851" cy="248851"/>
+          </a:xfrm>
+          <a:prstGeom prst="ellipse">
+            <a:avLst/>
+          </a:prstGeom>
+          <a:solidFill>
+            <a:schemeClr val="accent2"/>
+          </a:solidFill>
+        </p:spPr>
+        <p:style>
+          <a:lnRef idx="2">
+            <a:schemeClr val="accent1">
+              <a:shade val="50000"/>
+            </a:schemeClr>
+          </a:lnRef>
+          <a:fillRef idx="1">
+            <a:schemeClr val="accent1"/>
+          </a:fillRef>
+          <a:effectRef idx="0">
+            <a:schemeClr val="accent1"/>
+          </a:effectRef>
+          <a:fontRef idx="minor">
+            <a:schemeClr val="lt1"/>
+          </a:fontRef>
+        </p:style>
+        <p:txBody>
+          <a:bodyPr rtlCol="0" anchor="ctr"/>
+          <a:lstStyle/>
+          <a:p>
+            <a:pPr algn="ctr"/>
+            <a:r>
+              <a:rPr lang="en-US" dirty="0"/>
+              <a:t>5</a:t>
+            </a:r>
+          </a:p>
+        </p:txBody>
+      </p:sp>
+      <p:sp>
+        <p:nvSpPr>
+          <p:cNvPr id="125" name="Oval 124">
+            <a:extLst>
+              <a:ext uri="{FF2B5EF4-FFF2-40B4-BE49-F238E27FC236}">
+                <a16:creationId xmlns:a16="http://schemas.microsoft.com/office/drawing/2014/main" id="{069E6A10-3E70-5845-B2FB-4EAACD1879E2}"/>
+              </a:ext>
+            </a:extLst>
+          </p:cNvPr>
+          <p:cNvSpPr/>
+          <p:nvPr/>
+        </p:nvSpPr>
+        <p:spPr>
+          <a:xfrm>
+            <a:off x="8582043" y="2582990"/>
+            <a:ext cx="248851" cy="248851"/>
+          </a:xfrm>
+          <a:prstGeom prst="ellipse">
+            <a:avLst/>
+          </a:prstGeom>
+          <a:solidFill>
+            <a:schemeClr val="accent2"/>
+          </a:solidFill>
+        </p:spPr>
+        <p:style>
+          <a:lnRef idx="2">
+            <a:schemeClr val="accent1">
+              <a:shade val="50000"/>
+            </a:schemeClr>
+          </a:lnRef>
+          <a:fillRef idx="1">
+            <a:schemeClr val="accent1"/>
+          </a:fillRef>
+          <a:effectRef idx="0">
+            <a:schemeClr val="accent1"/>
+          </a:effectRef>
+          <a:fontRef idx="minor">
+            <a:schemeClr val="lt1"/>
+          </a:fontRef>
+        </p:style>
+        <p:txBody>
+          <a:bodyPr rtlCol="0" anchor="ctr"/>
+          <a:lstStyle/>
+          <a:p>
+            <a:pPr algn="ctr"/>
+            <a:r>
+              <a:rPr lang="en-US" dirty="0"/>
+              <a:t>6</a:t>
+            </a:r>
+          </a:p>
+        </p:txBody>
+      </p:sp>
+    </p:spTree>
+    <p:extLst>
+      <p:ext uri="{BB962C8B-B14F-4D97-AF65-F5344CB8AC3E}">
+        <p14:creationId xmlns:p14="http://schemas.microsoft.com/office/powerpoint/2010/main" val="421616704"/>
+      </p:ext>
+    </p:extLst>
+  </p:cSld>
+  <p:clrMapOvr>
+    <a:masterClrMapping/>
+  </p:clrMapOvr>
+  <p:timing>
+    <p:tnLst>
+      <p:par>
+        <p:cTn id="1" dur="indefinite" restart="never" nodeType="tmRoot">
+          <p:childTnLst>
+            <p:seq concurrent="1" nextAc="seek">
+              <p:cTn id="2" dur="indefinite" nodeType="mainSeq">
+                <p:childTnLst>
+                  <p:par>
+                    <p:cTn id="3" fill="hold">
+                      <p:stCondLst>
+                        <p:cond delay="indefinite"/>
+                        <p:cond evt="onBegin" delay="0">
+                          <p:tn val="2"/>
+                        </p:cond>
+                      </p:stCondLst>
+                      <p:childTnLst>
+                        <p:par>
+                          <p:cTn id="4" fill="hold">
+                            <p:stCondLst>
+                              <p:cond delay="0"/>
+                            </p:stCondLst>
+                            <p:childTnLst>
+                              <p:par>
+                                <p:cTn id="5" presetID="1" presetClass="entr" presetSubtype="0" fill="hold" nodeType="withEffect">
+                                  <p:stCondLst>
+                                    <p:cond delay="0"/>
+                                  </p:stCondLst>
+                                  <p:childTnLst>
+                                    <p:set>
+                                      <p:cBhvr>
+                                        <p:cTn id="6" dur="1" fill="hold">
+                                          <p:stCondLst>
+                                            <p:cond delay="0"/>
+                                          </p:stCondLst>
+                                        </p:cTn>
+                                        <p:tgtEl>
+                                          <p:spTgt spid="63"/>
+                                        </p:tgtEl>
+                                        <p:attrNameLst>
+                                          <p:attrName>style.visibility</p:attrName>
+                                        </p:attrNameLst>
+                                      </p:cBhvr>
+                                      <p:to>
+                                        <p:strVal val="visible"/>
+                                      </p:to>
+                                    </p:set>
+                                  </p:childTnLst>
+                                </p:cTn>
+                              </p:par>
+                              <p:par>
+                                <p:cTn id="7" presetID="1" presetClass="entr" presetSubtype="0" fill="hold" nodeType="withEffect">
+                                  <p:stCondLst>
+                                    <p:cond delay="0"/>
+                                  </p:stCondLst>
+                                  <p:childTnLst>
+                                    <p:set>
+                                      <p:cBhvr>
+                                        <p:cTn id="8" dur="1" fill="hold">
+                                          <p:stCondLst>
+                                            <p:cond delay="0"/>
+                                          </p:stCondLst>
+                                        </p:cTn>
+                                        <p:tgtEl>
+                                          <p:spTgt spid="16"/>
+                                        </p:tgtEl>
+                                        <p:attrNameLst>
+                                          <p:attrName>style.visibility</p:attrName>
+                                        </p:attrNameLst>
+                                      </p:cBhvr>
+                                      <p:to>
+                                        <p:strVal val="visible"/>
+                                      </p:to>
+                                    </p:set>
+                                  </p:childTnLst>
+                                </p:cTn>
+                              </p:par>
+                            </p:childTnLst>
+                          </p:cTn>
+                        </p:par>
+                      </p:childTnLst>
+                    </p:cTn>
+                  </p:par>
+                  <p:par>
+                    <p:cTn id="9" fill="hold">
+                      <p:stCondLst>
+                        <p:cond delay="indefinite"/>
+                      </p:stCondLst>
+                      <p:childTnLst>
+                        <p:par>
+                          <p:cTn id="10" fill="hold">
+                            <p:stCondLst>
+                              <p:cond delay="0"/>
+                            </p:stCondLst>
+                            <p:childTnLst>
+                              <p:par>
+                                <p:cTn id="11" presetID="1" presetClass="entr" presetSubtype="0" fill="hold" nodeType="clickEffect">
+                                  <p:stCondLst>
+                                    <p:cond delay="0"/>
+                                  </p:stCondLst>
+                                  <p:childTnLst>
+                                    <p:set>
+                                      <p:cBhvr>
+                                        <p:cTn id="12" dur="1" fill="hold">
+                                          <p:stCondLst>
+                                            <p:cond delay="0"/>
+                                          </p:stCondLst>
+                                        </p:cTn>
+                                        <p:tgtEl>
+                                          <p:spTgt spid="40"/>
+                                        </p:tgtEl>
+                                        <p:attrNameLst>
+                                          <p:attrName>style.visibility</p:attrName>
+                                        </p:attrNameLst>
+                                      </p:cBhvr>
+                                      <p:to>
+                                        <p:strVal val="visible"/>
+                                      </p:to>
+                                    </p:set>
+                                  </p:childTnLst>
+                                </p:cTn>
+                              </p:par>
+                              <p:par>
+                                <p:cTn id="13" presetID="1" presetClass="entr" presetSubtype="0" fill="hold" nodeType="withEffect">
+                                  <p:stCondLst>
+                                    <p:cond delay="0"/>
+                                  </p:stCondLst>
+                                  <p:childTnLst>
+                                    <p:set>
+                                      <p:cBhvr>
+                                        <p:cTn id="14" dur="1" fill="hold">
+                                          <p:stCondLst>
+                                            <p:cond delay="0"/>
+                                          </p:stCondLst>
+                                        </p:cTn>
+                                        <p:tgtEl>
+                                          <p:spTgt spid="68"/>
+                                        </p:tgtEl>
+                                        <p:attrNameLst>
+                                          <p:attrName>style.visibility</p:attrName>
+                                        </p:attrNameLst>
+                                      </p:cBhvr>
+                                      <p:to>
+                                        <p:strVal val="visible"/>
+                                      </p:to>
+                                    </p:set>
+                                  </p:childTnLst>
+                                </p:cTn>
+                              </p:par>
+                            </p:childTnLst>
+                          </p:cTn>
+                        </p:par>
+                      </p:childTnLst>
+                    </p:cTn>
+                  </p:par>
+                  <p:par>
+                    <p:cTn id="15" fill="hold">
+                      <p:stCondLst>
+                        <p:cond delay="indefinite"/>
+                      </p:stCondLst>
+                      <p:childTnLst>
+                        <p:par>
+                          <p:cTn id="16" fill="hold">
+                            <p:stCondLst>
+                              <p:cond delay="0"/>
+                            </p:stCondLst>
+                            <p:childTnLst>
+                              <p:par>
+                                <p:cTn id="17" presetID="1" presetClass="entr" presetSubtype="0" fill="hold" nodeType="clickEffect">
+                                  <p:stCondLst>
+                                    <p:cond delay="0"/>
+                                  </p:stCondLst>
+                                  <p:childTnLst>
+                                    <p:set>
+                                      <p:cBhvr>
+                                        <p:cTn id="18" dur="1" fill="hold">
+                                          <p:stCondLst>
+                                            <p:cond delay="0"/>
+                                          </p:stCondLst>
+                                        </p:cTn>
+                                        <p:tgtEl>
+                                          <p:spTgt spid="60"/>
+                                        </p:tgtEl>
+                                        <p:attrNameLst>
+                                          <p:attrName>style.visibility</p:attrName>
+                                        </p:attrNameLst>
+                                      </p:cBhvr>
+                                      <p:to>
+                                        <p:strVal val="visible"/>
+                                      </p:to>
+                                    </p:set>
+                                  </p:childTnLst>
+                                </p:cTn>
+                              </p:par>
+                              <p:par>
+                                <p:cTn id="19" presetID="1" presetClass="entr" presetSubtype="0" fill="hold" nodeType="withEffect">
+                                  <p:stCondLst>
+                                    <p:cond delay="0"/>
+                                  </p:stCondLst>
+                                  <p:childTnLst>
+                                    <p:set>
+                                      <p:cBhvr>
+                                        <p:cTn id="20" dur="1" fill="hold">
+                                          <p:stCondLst>
+                                            <p:cond delay="0"/>
+                                          </p:stCondLst>
+                                        </p:cTn>
+                                        <p:tgtEl>
+                                          <p:spTgt spid="85"/>
+                                        </p:tgtEl>
+                                        <p:attrNameLst>
+                                          <p:attrName>style.visibility</p:attrName>
+                                        </p:attrNameLst>
+                                      </p:cBhvr>
+                                      <p:to>
+                                        <p:strVal val="visible"/>
+                                      </p:to>
+                                    </p:set>
+                                  </p:childTnLst>
+                                </p:cTn>
+                              </p:par>
+                            </p:childTnLst>
+                          </p:cTn>
+                        </p:par>
+                      </p:childTnLst>
+                    </p:cTn>
+                  </p:par>
+                </p:childTnLst>
+              </p:cTn>
+              <p:prevCondLst>
+                <p:cond evt="onPrev" delay="0">
+                  <p:tgtEl>
+                    <p:sldTgt/>
+                  </p:tgtEl>
+                </p:cond>
+              </p:prevCondLst>
+              <p:nextCondLst>
+                <p:cond evt="onNext" delay="0">
+                  <p:tgtEl>
+                    <p:sldTgt/>
+                  </p:tgtEl>
+                </p:cond>
+              </p:nextCondLst>
+            </p:seq>
+          </p:childTnLst>
+        </p:cTn>
+      </p:par>
+    </p:tnLst>
+  </p:timing>
+</p:sld>
+</file>
+
+<file path=ppt/slides/slide5.xml><?xml version="1.0" encoding="utf-8"?>
+<p:sld xmlns:a="http://schemas.openxmlformats.org/drawingml/2006/main" xmlns:r="http://schemas.openxmlformats.org/officeDocument/2006/relationships" xmlns:p="http://schemas.openxmlformats.org/presentationml/2006/main">
+  <p:cSld>
+    <p:spTree>
+      <p:nvGrpSpPr>
+        <p:cNvPr id="1" name=""/>
+        <p:cNvGrpSpPr/>
+        <p:nvPr/>
+      </p:nvGrpSpPr>
+      <p:grpSpPr>
+        <a:xfrm>
+          <a:off x="0" y="0"/>
+          <a:ext cx="0" cy="0"/>
+          <a:chOff x="0" y="0"/>
+          <a:chExt cx="0" cy="0"/>
+        </a:xfrm>
+      </p:grpSpPr>
     </p:spTree>
     <p:extLst>
       <p:ext uri="{BB962C8B-B14F-4D97-AF65-F5344CB8AC3E}">

</xml_diff>